<commit_message>
update member log image
</commit_message>
<xml_diff>
--- a/content/ko/about/Member/kwg-member-logo.pptx
+++ b/content/ko/about/Member/kwg-member-logo.pptx
@@ -5,10 +5,8 @@
     <p:sldMasterId id="2147483648" r:id="rId1"/>
   </p:sldMasterIdLst>
   <p:sldIdLst>
-    <p:sldId id="259" r:id="rId2"/>
-    <p:sldId id="263" r:id="rId3"/>
-    <p:sldId id="265" r:id="rId4"/>
-    <p:sldId id="266" r:id="rId5"/>
+    <p:sldId id="269" r:id="rId2"/>
+    <p:sldId id="268" r:id="rId3"/>
   </p:sldIdLst>
   <p:sldSz cx="12192000" cy="6858000"/>
   <p:notesSz cx="6858000" cy="9144000"/>
@@ -262,7 +260,7 @@
           <a:p>
             <a:fld id="{BB0F4908-A70F-4341-B442-EC44EC00E078}" type="datetimeFigureOut">
               <a:rPr lang="ko-KR" altLang="en-US" smtClean="0"/>
-              <a:t>2022. 8. 6.</a:t>
+              <a:t>2022. 12. 4.</a:t>
             </a:fld>
             <a:endParaRPr lang="ko-KR" altLang="en-US"/>
           </a:p>
@@ -460,7 +458,7 @@
           <a:p>
             <a:fld id="{BB0F4908-A70F-4341-B442-EC44EC00E078}" type="datetimeFigureOut">
               <a:rPr lang="ko-KR" altLang="en-US" smtClean="0"/>
-              <a:t>2022. 8. 6.</a:t>
+              <a:t>2022. 12. 4.</a:t>
             </a:fld>
             <a:endParaRPr lang="ko-KR" altLang="en-US"/>
           </a:p>
@@ -668,7 +666,7 @@
           <a:p>
             <a:fld id="{BB0F4908-A70F-4341-B442-EC44EC00E078}" type="datetimeFigureOut">
               <a:rPr lang="ko-KR" altLang="en-US" smtClean="0"/>
-              <a:t>2022. 8. 6.</a:t>
+              <a:t>2022. 12. 4.</a:t>
             </a:fld>
             <a:endParaRPr lang="ko-KR" altLang="en-US"/>
           </a:p>
@@ -866,7 +864,7 @@
           <a:p>
             <a:fld id="{BB0F4908-A70F-4341-B442-EC44EC00E078}" type="datetimeFigureOut">
               <a:rPr lang="ko-KR" altLang="en-US" smtClean="0"/>
-              <a:t>2022. 8. 6.</a:t>
+              <a:t>2022. 12. 4.</a:t>
             </a:fld>
             <a:endParaRPr lang="ko-KR" altLang="en-US"/>
           </a:p>
@@ -1141,7 +1139,7 @@
           <a:p>
             <a:fld id="{BB0F4908-A70F-4341-B442-EC44EC00E078}" type="datetimeFigureOut">
               <a:rPr lang="ko-KR" altLang="en-US" smtClean="0"/>
-              <a:t>2022. 8. 6.</a:t>
+              <a:t>2022. 12. 4.</a:t>
             </a:fld>
             <a:endParaRPr lang="ko-KR" altLang="en-US"/>
           </a:p>
@@ -1406,7 +1404,7 @@
           <a:p>
             <a:fld id="{BB0F4908-A70F-4341-B442-EC44EC00E078}" type="datetimeFigureOut">
               <a:rPr lang="ko-KR" altLang="en-US" smtClean="0"/>
-              <a:t>2022. 8. 6.</a:t>
+              <a:t>2022. 12. 4.</a:t>
             </a:fld>
             <a:endParaRPr lang="ko-KR" altLang="en-US"/>
           </a:p>
@@ -1818,7 +1816,7 @@
           <a:p>
             <a:fld id="{BB0F4908-A70F-4341-B442-EC44EC00E078}" type="datetimeFigureOut">
               <a:rPr lang="ko-KR" altLang="en-US" smtClean="0"/>
-              <a:t>2022. 8. 6.</a:t>
+              <a:t>2022. 12. 4.</a:t>
             </a:fld>
             <a:endParaRPr lang="ko-KR" altLang="en-US"/>
           </a:p>
@@ -1959,7 +1957,7 @@
           <a:p>
             <a:fld id="{BB0F4908-A70F-4341-B442-EC44EC00E078}" type="datetimeFigureOut">
               <a:rPr lang="ko-KR" altLang="en-US" smtClean="0"/>
-              <a:t>2022. 8. 6.</a:t>
+              <a:t>2022. 12. 4.</a:t>
             </a:fld>
             <a:endParaRPr lang="ko-KR" altLang="en-US"/>
           </a:p>
@@ -2072,7 +2070,7 @@
           <a:p>
             <a:fld id="{BB0F4908-A70F-4341-B442-EC44EC00E078}" type="datetimeFigureOut">
               <a:rPr lang="ko-KR" altLang="en-US" smtClean="0"/>
-              <a:t>2022. 8. 6.</a:t>
+              <a:t>2022. 12. 4.</a:t>
             </a:fld>
             <a:endParaRPr lang="ko-KR" altLang="en-US"/>
           </a:p>
@@ -2383,7 +2381,7 @@
           <a:p>
             <a:fld id="{BB0F4908-A70F-4341-B442-EC44EC00E078}" type="datetimeFigureOut">
               <a:rPr lang="ko-KR" altLang="en-US" smtClean="0"/>
-              <a:t>2022. 8. 6.</a:t>
+              <a:t>2022. 12. 4.</a:t>
             </a:fld>
             <a:endParaRPr lang="ko-KR" altLang="en-US"/>
           </a:p>
@@ -2671,7 +2669,7 @@
           <a:p>
             <a:fld id="{BB0F4908-A70F-4341-B442-EC44EC00E078}" type="datetimeFigureOut">
               <a:rPr lang="ko-KR" altLang="en-US" smtClean="0"/>
-              <a:t>2022. 8. 6.</a:t>
+              <a:t>2022. 12. 4.</a:t>
             </a:fld>
             <a:endParaRPr lang="ko-KR" altLang="en-US"/>
           </a:p>
@@ -2912,7 +2910,7 @@
           <a:p>
             <a:fld id="{BB0F4908-A70F-4341-B442-EC44EC00E078}" type="datetimeFigureOut">
               <a:rPr lang="ko-KR" altLang="en-US" smtClean="0"/>
-              <a:t>2022. 8. 6.</a:t>
+              <a:t>2022. 12. 4.</a:t>
             </a:fld>
             <a:endParaRPr lang="ko-KR" altLang="en-US"/>
           </a:p>
@@ -3331,914 +3329,21 @@
       </p:grpSpPr>
       <p:graphicFrame>
         <p:nvGraphicFramePr>
-          <p:cNvPr id="4" name="Table 4">
-            <a:extLst>
-              <a:ext uri="{FF2B5EF4-FFF2-40B4-BE49-F238E27FC236}">
-                <a16:creationId xmlns:a16="http://schemas.microsoft.com/office/drawing/2014/main" id="{E8CF941F-C829-E543-8644-601DFB433520}"/>
+          <p:cNvPr id="2" name="Table 2">
+            <a:extLst>
+              <a:ext uri="{FF2B5EF4-FFF2-40B4-BE49-F238E27FC236}">
+                <a16:creationId xmlns:a16="http://schemas.microsoft.com/office/drawing/2014/main" id="{7FCF282C-1FE0-6B4A-87A2-BB4E34AA6B80}"/>
               </a:ext>
             </a:extLst>
           </p:cNvPr>
           <p:cNvGraphicFramePr>
             <a:graphicFrameLocks noGrp="1"/>
           </p:cNvGraphicFramePr>
-          <p:nvPr>
-            <p:extLst>
-              <p:ext uri="{D42A27DB-BD31-4B8C-83A1-F6EECF244321}">
-                <p14:modId xmlns:p14="http://schemas.microsoft.com/office/powerpoint/2010/main" val="1465203869"/>
-              </p:ext>
-            </p:extLst>
-          </p:nvPr>
+          <p:nvPr/>
         </p:nvGraphicFramePr>
         <p:xfrm>
-          <a:off x="256540" y="216746"/>
-          <a:ext cx="11676380" cy="6443136"/>
-        </p:xfrm>
-        <a:graphic>
-          <a:graphicData uri="http://schemas.openxmlformats.org/drawingml/2006/table">
-            <a:tbl>
-              <a:tblPr firstRow="1" bandRow="1">
-                <a:tableStyleId>{5C22544A-7EE6-4342-B048-85BDC9FD1C3A}</a:tableStyleId>
-              </a:tblPr>
-              <a:tblGrid>
-                <a:gridCol w="2919095">
-                  <a:extLst>
-                    <a:ext uri="{9D8B030D-6E8A-4147-A177-3AD203B41FA5}">
-                      <a16:colId xmlns:a16="http://schemas.microsoft.com/office/drawing/2014/main" val="2753378547"/>
-                    </a:ext>
-                  </a:extLst>
-                </a:gridCol>
-                <a:gridCol w="2919095">
-                  <a:extLst>
-                    <a:ext uri="{9D8B030D-6E8A-4147-A177-3AD203B41FA5}">
-                      <a16:colId xmlns:a16="http://schemas.microsoft.com/office/drawing/2014/main" val="1631276507"/>
-                    </a:ext>
-                  </a:extLst>
-                </a:gridCol>
-                <a:gridCol w="2919095">
-                  <a:extLst>
-                    <a:ext uri="{9D8B030D-6E8A-4147-A177-3AD203B41FA5}">
-                      <a16:colId xmlns:a16="http://schemas.microsoft.com/office/drawing/2014/main" val="1625050857"/>
-                    </a:ext>
-                  </a:extLst>
-                </a:gridCol>
-                <a:gridCol w="2919095">
-                  <a:extLst>
-                    <a:ext uri="{9D8B030D-6E8A-4147-A177-3AD203B41FA5}">
-                      <a16:colId xmlns:a16="http://schemas.microsoft.com/office/drawing/2014/main" val="1612428783"/>
-                    </a:ext>
-                  </a:extLst>
-                </a:gridCol>
-              </a:tblGrid>
-              <a:tr h="1610784">
-                <a:tc>
-                  <a:txBody>
-                    <a:bodyPr/>
-                    <a:lstStyle/>
-                    <a:p>
-                      <a:endParaRPr lang="en-KR"/>
-                    </a:p>
-                  </a:txBody>
-                  <a:tcPr/>
-                </a:tc>
-                <a:tc>
-                  <a:txBody>
-                    <a:bodyPr/>
-                    <a:lstStyle/>
-                    <a:p>
-                      <a:endParaRPr lang="en-KR"/>
-                    </a:p>
-                  </a:txBody>
-                  <a:tcPr/>
-                </a:tc>
-                <a:tc>
-                  <a:txBody>
-                    <a:bodyPr/>
-                    <a:lstStyle/>
-                    <a:p>
-                      <a:endParaRPr lang="en-KR"/>
-                    </a:p>
-                  </a:txBody>
-                  <a:tcPr/>
-                </a:tc>
-                <a:tc>
-                  <a:txBody>
-                    <a:bodyPr/>
-                    <a:lstStyle/>
-                    <a:p>
-                      <a:endParaRPr lang="en-KR"/>
-                    </a:p>
-                  </a:txBody>
-                  <a:tcPr/>
-                </a:tc>
-                <a:extLst>
-                  <a:ext uri="{0D108BD9-81ED-4DB2-BD59-A6C34878D82A}">
-                    <a16:rowId xmlns:a16="http://schemas.microsoft.com/office/drawing/2014/main" val="3312123481"/>
-                  </a:ext>
-                </a:extLst>
-              </a:tr>
-              <a:tr h="1610784">
-                <a:tc>
-                  <a:txBody>
-                    <a:bodyPr/>
-                    <a:lstStyle/>
-                    <a:p>
-                      <a:endParaRPr lang="en-KR" dirty="0"/>
-                    </a:p>
-                  </a:txBody>
-                  <a:tcPr/>
-                </a:tc>
-                <a:tc>
-                  <a:txBody>
-                    <a:bodyPr/>
-                    <a:lstStyle/>
-                    <a:p>
-                      <a:endParaRPr lang="en-KR"/>
-                    </a:p>
-                  </a:txBody>
-                  <a:tcPr/>
-                </a:tc>
-                <a:tc>
-                  <a:txBody>
-                    <a:bodyPr/>
-                    <a:lstStyle/>
-                    <a:p>
-                      <a:endParaRPr lang="en-KR"/>
-                    </a:p>
-                  </a:txBody>
-                  <a:tcPr/>
-                </a:tc>
-                <a:tc>
-                  <a:txBody>
-                    <a:bodyPr/>
-                    <a:lstStyle/>
-                    <a:p>
-                      <a:endParaRPr lang="en-KR"/>
-                    </a:p>
-                  </a:txBody>
-                  <a:tcPr/>
-                </a:tc>
-                <a:extLst>
-                  <a:ext uri="{0D108BD9-81ED-4DB2-BD59-A6C34878D82A}">
-                    <a16:rowId xmlns:a16="http://schemas.microsoft.com/office/drawing/2014/main" val="1523720146"/>
-                  </a:ext>
-                </a:extLst>
-              </a:tr>
-              <a:tr h="1610784">
-                <a:tc>
-                  <a:txBody>
-                    <a:bodyPr/>
-                    <a:lstStyle/>
-                    <a:p>
-                      <a:endParaRPr lang="en-KR"/>
-                    </a:p>
-                  </a:txBody>
-                  <a:tcPr/>
-                </a:tc>
-                <a:tc>
-                  <a:txBody>
-                    <a:bodyPr/>
-                    <a:lstStyle/>
-                    <a:p>
-                      <a:endParaRPr lang="en-KR"/>
-                    </a:p>
-                  </a:txBody>
-                  <a:tcPr/>
-                </a:tc>
-                <a:tc>
-                  <a:txBody>
-                    <a:bodyPr/>
-                    <a:lstStyle/>
-                    <a:p>
-                      <a:endParaRPr lang="en-KR" dirty="0"/>
-                    </a:p>
-                  </a:txBody>
-                  <a:tcPr/>
-                </a:tc>
-                <a:tc>
-                  <a:txBody>
-                    <a:bodyPr/>
-                    <a:lstStyle/>
-                    <a:p>
-                      <a:endParaRPr lang="en-KR"/>
-                    </a:p>
-                  </a:txBody>
-                  <a:tcPr/>
-                </a:tc>
-                <a:extLst>
-                  <a:ext uri="{0D108BD9-81ED-4DB2-BD59-A6C34878D82A}">
-                    <a16:rowId xmlns:a16="http://schemas.microsoft.com/office/drawing/2014/main" val="765055842"/>
-                  </a:ext>
-                </a:extLst>
-              </a:tr>
-              <a:tr h="1610784">
-                <a:tc>
-                  <a:txBody>
-                    <a:bodyPr/>
-                    <a:lstStyle/>
-                    <a:p>
-                      <a:endParaRPr lang="en-KR"/>
-                    </a:p>
-                  </a:txBody>
-                  <a:tcPr/>
-                </a:tc>
-                <a:tc>
-                  <a:txBody>
-                    <a:bodyPr/>
-                    <a:lstStyle/>
-                    <a:p>
-                      <a:endParaRPr lang="en-KR" dirty="0"/>
-                    </a:p>
-                  </a:txBody>
-                  <a:tcPr/>
-                </a:tc>
-                <a:tc>
-                  <a:txBody>
-                    <a:bodyPr/>
-                    <a:lstStyle/>
-                    <a:p>
-                      <a:endParaRPr lang="en-KR" dirty="0"/>
-                    </a:p>
-                  </a:txBody>
-                  <a:tcPr/>
-                </a:tc>
-                <a:tc>
-                  <a:txBody>
-                    <a:bodyPr/>
-                    <a:lstStyle/>
-                    <a:p>
-                      <a:endParaRPr lang="en-KR" dirty="0"/>
-                    </a:p>
-                  </a:txBody>
-                  <a:tcPr/>
-                </a:tc>
-                <a:extLst>
-                  <a:ext uri="{0D108BD9-81ED-4DB2-BD59-A6C34878D82A}">
-                    <a16:rowId xmlns:a16="http://schemas.microsoft.com/office/drawing/2014/main" val="1347873489"/>
-                  </a:ext>
-                </a:extLst>
-              </a:tr>
-            </a:tbl>
-          </a:graphicData>
-        </a:graphic>
-      </p:graphicFrame>
-      <p:pic>
-        <p:nvPicPr>
-          <p:cNvPr id="5" name="Picture 4">
-            <a:extLst>
-              <a:ext uri="{FF2B5EF4-FFF2-40B4-BE49-F238E27FC236}">
-                <a16:creationId xmlns:a16="http://schemas.microsoft.com/office/drawing/2014/main" id="{2A3E34AA-E6F8-7942-960A-D2DAB9736BD5}"/>
-              </a:ext>
-            </a:extLst>
-          </p:cNvPr>
-          <p:cNvPicPr>
-            <a:picLocks noChangeAspect="1"/>
-          </p:cNvPicPr>
-          <p:nvPr/>
-        </p:nvPicPr>
-        <p:blipFill>
-          <a:blip r:embed="rId2"/>
-          <a:stretch>
-            <a:fillRect/>
-          </a:stretch>
-        </p:blipFill>
-        <p:spPr>
-          <a:xfrm>
-            <a:off x="571500" y="571500"/>
-            <a:ext cx="2438400" cy="914400"/>
-          </a:xfrm>
-          <a:prstGeom prst="rect">
-            <a:avLst/>
-          </a:prstGeom>
-        </p:spPr>
-      </p:pic>
-      <p:pic>
-        <p:nvPicPr>
-          <p:cNvPr id="8" name="그림 16">
-            <a:extLst>
-              <a:ext uri="{FF2B5EF4-FFF2-40B4-BE49-F238E27FC236}">
-                <a16:creationId xmlns:a16="http://schemas.microsoft.com/office/drawing/2014/main" id="{8CFAD5D4-2CE1-E243-A9B6-98CC3EBB3678}"/>
-              </a:ext>
-            </a:extLst>
-          </p:cNvPr>
-          <p:cNvPicPr>
-            <a:picLocks noChangeAspect="1"/>
-          </p:cNvPicPr>
-          <p:nvPr/>
-        </p:nvPicPr>
-        <p:blipFill>
-          <a:blip r:embed="rId3"/>
-          <a:stretch>
-            <a:fillRect/>
-          </a:stretch>
-        </p:blipFill>
-        <p:spPr>
-          <a:xfrm>
-            <a:off x="3162300" y="803673"/>
-            <a:ext cx="2880360" cy="477991"/>
-          </a:xfrm>
-          <a:prstGeom prst="rect">
-            <a:avLst/>
-          </a:prstGeom>
-        </p:spPr>
-      </p:pic>
-      <p:pic>
-        <p:nvPicPr>
-          <p:cNvPr id="9" name="Picture 8">
-            <a:extLst>
-              <a:ext uri="{FF2B5EF4-FFF2-40B4-BE49-F238E27FC236}">
-                <a16:creationId xmlns:a16="http://schemas.microsoft.com/office/drawing/2014/main" id="{D171F5C4-7E8D-254B-AF3E-3D4B564C4F39}"/>
-              </a:ext>
-            </a:extLst>
-          </p:cNvPr>
-          <p:cNvPicPr>
-            <a:picLocks noChangeAspect="1"/>
-          </p:cNvPicPr>
-          <p:nvPr/>
-        </p:nvPicPr>
-        <p:blipFill>
-          <a:blip r:embed="rId4"/>
-          <a:stretch>
-            <a:fillRect/>
-          </a:stretch>
-        </p:blipFill>
-        <p:spPr>
-          <a:xfrm>
-            <a:off x="6195060" y="571500"/>
-            <a:ext cx="2692400" cy="807720"/>
-          </a:xfrm>
-          <a:prstGeom prst="rect">
-            <a:avLst/>
-          </a:prstGeom>
-        </p:spPr>
-      </p:pic>
-      <p:pic>
-        <p:nvPicPr>
-          <p:cNvPr id="10" name="Picture 9">
-            <a:extLst>
-              <a:ext uri="{FF2B5EF4-FFF2-40B4-BE49-F238E27FC236}">
-                <a16:creationId xmlns:a16="http://schemas.microsoft.com/office/drawing/2014/main" id="{E8F4643A-176D-394E-A803-97F83C031AA4}"/>
-              </a:ext>
-            </a:extLst>
-          </p:cNvPr>
-          <p:cNvPicPr>
-            <a:picLocks noChangeAspect="1"/>
-          </p:cNvPicPr>
-          <p:nvPr/>
-        </p:nvPicPr>
-        <p:blipFill>
-          <a:blip r:embed="rId5"/>
-          <a:stretch>
-            <a:fillRect/>
-          </a:stretch>
-        </p:blipFill>
-        <p:spPr>
-          <a:xfrm>
-            <a:off x="9144000" y="544253"/>
-            <a:ext cx="2667000" cy="941647"/>
-          </a:xfrm>
-          <a:prstGeom prst="rect">
-            <a:avLst/>
-          </a:prstGeom>
-        </p:spPr>
-      </p:pic>
-      <p:pic>
-        <p:nvPicPr>
-          <p:cNvPr id="13" name="그림 5">
-            <a:extLst>
-              <a:ext uri="{FF2B5EF4-FFF2-40B4-BE49-F238E27FC236}">
-                <a16:creationId xmlns:a16="http://schemas.microsoft.com/office/drawing/2014/main" id="{69BF753C-062B-DB44-A595-4E2EC3536B83}"/>
-              </a:ext>
-            </a:extLst>
-          </p:cNvPr>
-          <p:cNvPicPr>
-            <a:picLocks noChangeAspect="1"/>
-          </p:cNvPicPr>
-          <p:nvPr/>
-        </p:nvPicPr>
-        <p:blipFill>
-          <a:blip r:embed="rId6"/>
-          <a:stretch>
-            <a:fillRect/>
-          </a:stretch>
-        </p:blipFill>
-        <p:spPr>
-          <a:xfrm>
-            <a:off x="520472" y="2122596"/>
-            <a:ext cx="2387373" cy="1016844"/>
-          </a:xfrm>
-          <a:prstGeom prst="rect">
-            <a:avLst/>
-          </a:prstGeom>
-        </p:spPr>
-      </p:pic>
-      <p:pic>
-        <p:nvPicPr>
-          <p:cNvPr id="14" name="Picture 10" descr="Koh Young Technology - 2020년 전문연구요원 모집">
-            <a:extLst>
-              <a:ext uri="{FF2B5EF4-FFF2-40B4-BE49-F238E27FC236}">
-                <a16:creationId xmlns:a16="http://schemas.microsoft.com/office/drawing/2014/main" id="{6E7DE2E4-6EA1-634A-BB34-9F170084E9A8}"/>
-              </a:ext>
-            </a:extLst>
-          </p:cNvPr>
-          <p:cNvPicPr>
-            <a:picLocks noChangeAspect="1" noChangeArrowheads="1"/>
-          </p:cNvPicPr>
-          <p:nvPr/>
-        </p:nvPicPr>
-        <p:blipFill>
-          <a:blip r:embed="rId7">
-            <a:extLst>
-              <a:ext uri="{28A0092B-C50C-407E-A947-70E740481C1C}">
-                <a14:useLocalDpi xmlns:a14="http://schemas.microsoft.com/office/drawing/2010/main" val="0"/>
-              </a:ext>
-            </a:extLst>
-          </a:blip>
-          <a:srcRect/>
-          <a:stretch>
-            <a:fillRect/>
-          </a:stretch>
-        </p:blipFill>
-        <p:spPr bwMode="auto">
-          <a:xfrm>
-            <a:off x="3366095" y="1868591"/>
-            <a:ext cx="2600365" cy="1547554"/>
-          </a:xfrm>
-          <a:prstGeom prst="rect">
-            <a:avLst/>
-          </a:prstGeom>
-          <a:noFill/>
-          <a:extLst>
-            <a:ext uri="{909E8E84-426E-40DD-AFC4-6F175D3DCCD1}">
-              <a14:hiddenFill xmlns:a14="http://schemas.microsoft.com/office/drawing/2010/main">
-                <a:solidFill>
-                  <a:srgbClr val="FFFFFF"/>
-                </a:solidFill>
-              </a14:hiddenFill>
-            </a:ext>
-          </a:extLst>
-        </p:spPr>
-      </p:pic>
-      <p:pic>
-        <p:nvPicPr>
-          <p:cNvPr id="15" name="그림 7">
-            <a:extLst>
-              <a:ext uri="{FF2B5EF4-FFF2-40B4-BE49-F238E27FC236}">
-                <a16:creationId xmlns:a16="http://schemas.microsoft.com/office/drawing/2014/main" id="{555B7972-B035-DB43-8CB7-BA0F60856DB1}"/>
-              </a:ext>
-            </a:extLst>
-          </p:cNvPr>
-          <p:cNvPicPr>
-            <a:picLocks noChangeAspect="1"/>
-          </p:cNvPicPr>
-          <p:nvPr/>
-        </p:nvPicPr>
-        <p:blipFill>
-          <a:blip r:embed="rId8"/>
-          <a:stretch>
-            <a:fillRect/>
-          </a:stretch>
-        </p:blipFill>
-        <p:spPr>
-          <a:xfrm>
-            <a:off x="6991776" y="2168809"/>
-            <a:ext cx="1154717" cy="970631"/>
-          </a:xfrm>
-          <a:prstGeom prst="rect">
-            <a:avLst/>
-          </a:prstGeom>
-        </p:spPr>
-      </p:pic>
-      <p:pic>
-        <p:nvPicPr>
-          <p:cNvPr id="16" name="그림 11">
-            <a:extLst>
-              <a:ext uri="{FF2B5EF4-FFF2-40B4-BE49-F238E27FC236}">
-                <a16:creationId xmlns:a16="http://schemas.microsoft.com/office/drawing/2014/main" id="{8C8B22C8-9EDF-BB4B-A266-DEDD61EB6C7D}"/>
-              </a:ext>
-            </a:extLst>
-          </p:cNvPr>
-          <p:cNvPicPr>
-            <a:picLocks noChangeAspect="1"/>
-          </p:cNvPicPr>
-          <p:nvPr/>
-        </p:nvPicPr>
-        <p:blipFill>
-          <a:blip r:embed="rId9">
-            <a:extLst>
-              <a:ext uri="{28A0092B-C50C-407E-A947-70E740481C1C}">
-                <a14:useLocalDpi xmlns:a14="http://schemas.microsoft.com/office/drawing/2010/main" val="0"/>
-              </a:ext>
-            </a:extLst>
-          </a:blip>
-          <a:stretch>
-            <a:fillRect/>
-          </a:stretch>
-        </p:blipFill>
-        <p:spPr>
-          <a:xfrm>
-            <a:off x="9144000" y="2148969"/>
-            <a:ext cx="2568538" cy="970630"/>
-          </a:xfrm>
-          <a:prstGeom prst="rect">
-            <a:avLst/>
-          </a:prstGeom>
-        </p:spPr>
-      </p:pic>
-      <p:pic>
-        <p:nvPicPr>
-          <p:cNvPr id="18" name="Picture 26" descr="라인플러스 기업정보 보기">
-            <a:extLst>
-              <a:ext uri="{FF2B5EF4-FFF2-40B4-BE49-F238E27FC236}">
-                <a16:creationId xmlns:a16="http://schemas.microsoft.com/office/drawing/2014/main" id="{C78AD2BF-D78F-A246-8CB1-CA5E54E6A075}"/>
-              </a:ext>
-            </a:extLst>
-          </p:cNvPr>
-          <p:cNvPicPr>
-            <a:picLocks noChangeAspect="1" noChangeArrowheads="1"/>
-          </p:cNvPicPr>
-          <p:nvPr/>
-        </p:nvPicPr>
-        <p:blipFill>
-          <a:blip r:embed="rId10">
-            <a:extLst>
-              <a:ext uri="{28A0092B-C50C-407E-A947-70E740481C1C}">
-                <a14:useLocalDpi xmlns:a14="http://schemas.microsoft.com/office/drawing/2010/main" val="0"/>
-              </a:ext>
-            </a:extLst>
-          </a:blip>
-          <a:srcRect/>
-          <a:stretch>
-            <a:fillRect/>
-          </a:stretch>
-        </p:blipFill>
-        <p:spPr bwMode="auto">
-          <a:xfrm>
-            <a:off x="3603710" y="3846829"/>
-            <a:ext cx="2195110" cy="767441"/>
-          </a:xfrm>
-          <a:prstGeom prst="rect">
-            <a:avLst/>
-          </a:prstGeom>
-          <a:noFill/>
-          <a:extLst>
-            <a:ext uri="{909E8E84-426E-40DD-AFC4-6F175D3DCCD1}">
-              <a14:hiddenFill xmlns:a14="http://schemas.microsoft.com/office/drawing/2010/main">
-                <a:solidFill>
-                  <a:srgbClr val="FFFFFF"/>
-                </a:solidFill>
-              </a14:hiddenFill>
-            </a:ext>
-          </a:extLst>
-        </p:spPr>
-      </p:pic>
-      <p:pic>
-        <p:nvPicPr>
-          <p:cNvPr id="19" name="Picture 30" descr="LG전자 (엘지) 로고">
-            <a:extLst>
-              <a:ext uri="{FF2B5EF4-FFF2-40B4-BE49-F238E27FC236}">
-                <a16:creationId xmlns:a16="http://schemas.microsoft.com/office/drawing/2014/main" id="{E2D22F20-8D28-3C4F-9F08-3CFFBB0EF5E2}"/>
-              </a:ext>
-            </a:extLst>
-          </p:cNvPr>
-          <p:cNvPicPr>
-            <a:picLocks noChangeAspect="1" noChangeArrowheads="1"/>
-          </p:cNvPicPr>
-          <p:nvPr/>
-        </p:nvPicPr>
-        <p:blipFill>
-          <a:blip r:embed="rId11">
-            <a:extLst>
-              <a:ext uri="{28A0092B-C50C-407E-A947-70E740481C1C}">
-                <a14:useLocalDpi xmlns:a14="http://schemas.microsoft.com/office/drawing/2010/main" val="0"/>
-              </a:ext>
-            </a:extLst>
-          </a:blip>
-          <a:srcRect/>
-          <a:stretch>
-            <a:fillRect/>
-          </a:stretch>
-        </p:blipFill>
-        <p:spPr bwMode="auto">
-          <a:xfrm>
-            <a:off x="278291" y="3971243"/>
-            <a:ext cx="2820509" cy="618945"/>
-          </a:xfrm>
-          <a:prstGeom prst="rect">
-            <a:avLst/>
-          </a:prstGeom>
-          <a:noFill/>
-          <a:extLst>
-            <a:ext uri="{909E8E84-426E-40DD-AFC4-6F175D3DCCD1}">
-              <a14:hiddenFill xmlns:a14="http://schemas.microsoft.com/office/drawing/2010/main">
-                <a:solidFill>
-                  <a:srgbClr val="FFFFFF"/>
-                </a:solidFill>
-              </a14:hiddenFill>
-            </a:ext>
-          </a:extLst>
-        </p:spPr>
-      </p:pic>
-      <p:pic>
-        <p:nvPicPr>
-          <p:cNvPr id="20" name="Picture 8" descr="SKT CI">
-            <a:extLst>
-              <a:ext uri="{FF2B5EF4-FFF2-40B4-BE49-F238E27FC236}">
-                <a16:creationId xmlns:a16="http://schemas.microsoft.com/office/drawing/2014/main" id="{8E0B4595-8603-9048-B575-C14AFC03F057}"/>
-              </a:ext>
-            </a:extLst>
-          </p:cNvPr>
-          <p:cNvPicPr>
-            <a:picLocks noChangeAspect="1" noChangeArrowheads="1"/>
-          </p:cNvPicPr>
-          <p:nvPr/>
-        </p:nvPicPr>
-        <p:blipFill>
-          <a:blip r:embed="rId12">
-            <a:extLst>
-              <a:ext uri="{28A0092B-C50C-407E-A947-70E740481C1C}">
-                <a14:useLocalDpi xmlns:a14="http://schemas.microsoft.com/office/drawing/2010/main" val="0"/>
-              </a:ext>
-            </a:extLst>
-          </a:blip>
-          <a:srcRect/>
-          <a:stretch>
-            <a:fillRect/>
-          </a:stretch>
-        </p:blipFill>
-        <p:spPr bwMode="auto">
-          <a:xfrm>
-            <a:off x="6272865" y="5319753"/>
-            <a:ext cx="2691817" cy="1034693"/>
-          </a:xfrm>
-          <a:prstGeom prst="rect">
-            <a:avLst/>
-          </a:prstGeom>
-          <a:noFill/>
-          <a:extLst>
-            <a:ext uri="{909E8E84-426E-40DD-AFC4-6F175D3DCCD1}">
-              <a14:hiddenFill xmlns:a14="http://schemas.microsoft.com/office/drawing/2010/main">
-                <a:solidFill>
-                  <a:srgbClr val="FFFFFF"/>
-                </a:solidFill>
-              </a14:hiddenFill>
-            </a:ext>
-          </a:extLst>
-        </p:spPr>
-      </p:pic>
-      <p:pic>
-        <p:nvPicPr>
-          <p:cNvPr id="21" name="Picture 18" descr="File:Samsung wordmark.svg">
-            <a:extLst>
-              <a:ext uri="{FF2B5EF4-FFF2-40B4-BE49-F238E27FC236}">
-                <a16:creationId xmlns:a16="http://schemas.microsoft.com/office/drawing/2014/main" id="{A1CB218D-72C4-D244-8EB5-C4CC072395B9}"/>
-              </a:ext>
-            </a:extLst>
-          </p:cNvPr>
-          <p:cNvPicPr>
-            <a:picLocks noChangeAspect="1" noChangeArrowheads="1"/>
-          </p:cNvPicPr>
-          <p:nvPr/>
-        </p:nvPicPr>
-        <p:blipFill>
-          <a:blip r:embed="rId13">
-            <a:extLst>
-              <a:ext uri="{28A0092B-C50C-407E-A947-70E740481C1C}">
-                <a14:useLocalDpi xmlns:a14="http://schemas.microsoft.com/office/drawing/2010/main" val="0"/>
-              </a:ext>
-            </a:extLst>
-          </a:blip>
-          <a:srcRect/>
-          <a:stretch>
-            <a:fillRect/>
-          </a:stretch>
-        </p:blipFill>
-        <p:spPr bwMode="auto">
-          <a:xfrm>
-            <a:off x="9074411" y="3971243"/>
-            <a:ext cx="2858509" cy="438304"/>
-          </a:xfrm>
-          <a:prstGeom prst="rect">
-            <a:avLst/>
-          </a:prstGeom>
-          <a:noFill/>
-          <a:extLst>
-            <a:ext uri="{909E8E84-426E-40DD-AFC4-6F175D3DCCD1}">
-              <a14:hiddenFill xmlns:a14="http://schemas.microsoft.com/office/drawing/2010/main">
-                <a:solidFill>
-                  <a:srgbClr val="FFFFFF"/>
-                </a:solidFill>
-              </a14:hiddenFill>
-            </a:ext>
-          </a:extLst>
-        </p:spPr>
-      </p:pic>
-      <p:pic>
-        <p:nvPicPr>
-          <p:cNvPr id="22" name="Picture 28" descr="image.fnnews.com/resource/media/image/2020/01/0...">
-            <a:extLst>
-              <a:ext uri="{FF2B5EF4-FFF2-40B4-BE49-F238E27FC236}">
-                <a16:creationId xmlns:a16="http://schemas.microsoft.com/office/drawing/2014/main" id="{F119BBDF-A3AF-4342-BB68-C2C9A34569D8}"/>
-              </a:ext>
-            </a:extLst>
-          </p:cNvPr>
-          <p:cNvPicPr>
-            <a:picLocks noChangeAspect="1" noChangeArrowheads="1"/>
-          </p:cNvPicPr>
-          <p:nvPr/>
-        </p:nvPicPr>
-        <p:blipFill>
-          <a:blip r:embed="rId14">
-            <a:extLst>
-              <a:ext uri="{28A0092B-C50C-407E-A947-70E740481C1C}">
-                <a14:useLocalDpi xmlns:a14="http://schemas.microsoft.com/office/drawing/2010/main" val="0"/>
-              </a:ext>
-            </a:extLst>
-          </a:blip>
-          <a:srcRect/>
-          <a:stretch>
-            <a:fillRect/>
-          </a:stretch>
-        </p:blipFill>
-        <p:spPr bwMode="auto">
-          <a:xfrm>
-            <a:off x="6513018" y="3568529"/>
-            <a:ext cx="2056483" cy="1385420"/>
-          </a:xfrm>
-          <a:prstGeom prst="rect">
-            <a:avLst/>
-          </a:prstGeom>
-          <a:noFill/>
-          <a:extLst>
-            <a:ext uri="{909E8E84-426E-40DD-AFC4-6F175D3DCCD1}">
-              <a14:hiddenFill xmlns:a14="http://schemas.microsoft.com/office/drawing/2010/main">
-                <a:solidFill>
-                  <a:srgbClr val="FFFFFF"/>
-                </a:solidFill>
-              </a14:hiddenFill>
-            </a:ext>
-          </a:extLst>
-        </p:spPr>
-      </p:pic>
-      <p:pic>
-        <p:nvPicPr>
-          <p:cNvPr id="23" name="그림 18">
-            <a:extLst>
-              <a:ext uri="{FF2B5EF4-FFF2-40B4-BE49-F238E27FC236}">
-                <a16:creationId xmlns:a16="http://schemas.microsoft.com/office/drawing/2014/main" id="{9FB85F5F-4522-2648-9AF3-5D4FB29893B4}"/>
-              </a:ext>
-            </a:extLst>
-          </p:cNvPr>
-          <p:cNvPicPr>
-            <a:picLocks noChangeAspect="1"/>
-          </p:cNvPicPr>
-          <p:nvPr/>
-        </p:nvPicPr>
-        <p:blipFill>
-          <a:blip r:embed="rId15"/>
-          <a:stretch>
-            <a:fillRect/>
-          </a:stretch>
-        </p:blipFill>
-        <p:spPr>
-          <a:xfrm>
-            <a:off x="3962608" y="5269333"/>
-            <a:ext cx="1572429" cy="1236571"/>
-          </a:xfrm>
-          <a:prstGeom prst="rect">
-            <a:avLst/>
-          </a:prstGeom>
-        </p:spPr>
-      </p:pic>
-      <p:pic>
-        <p:nvPicPr>
-          <p:cNvPr id="2" name="Picture 1">
-            <a:extLst>
-              <a:ext uri="{FF2B5EF4-FFF2-40B4-BE49-F238E27FC236}">
-                <a16:creationId xmlns:a16="http://schemas.microsoft.com/office/drawing/2014/main" id="{1B67DC35-ACAD-6B4F-ACEB-78CA012FEA0C}"/>
-              </a:ext>
-            </a:extLst>
-          </p:cNvPr>
-          <p:cNvPicPr>
-            <a:picLocks noChangeAspect="1"/>
-          </p:cNvPicPr>
-          <p:nvPr/>
-        </p:nvPicPr>
-        <p:blipFill>
-          <a:blip r:embed="rId16"/>
-          <a:stretch>
-            <a:fillRect/>
-          </a:stretch>
-        </p:blipFill>
-        <p:spPr>
-          <a:xfrm>
-            <a:off x="281940" y="5586035"/>
-            <a:ext cx="2880360" cy="700465"/>
-          </a:xfrm>
-          <a:prstGeom prst="rect">
-            <a:avLst/>
-          </a:prstGeom>
-        </p:spPr>
-      </p:pic>
-      <p:pic>
-        <p:nvPicPr>
-          <p:cNvPr id="24" name="Picture 4">
-            <a:extLst>
-              <a:ext uri="{FF2B5EF4-FFF2-40B4-BE49-F238E27FC236}">
-                <a16:creationId xmlns:a16="http://schemas.microsoft.com/office/drawing/2014/main" id="{D395D556-E00A-DD4B-BB4A-0FF7924D85AD}"/>
-              </a:ext>
-            </a:extLst>
-          </p:cNvPr>
-          <p:cNvPicPr>
-            <a:picLocks noChangeAspect="1" noChangeArrowheads="1"/>
-          </p:cNvPicPr>
-          <p:nvPr/>
-        </p:nvPicPr>
-        <p:blipFill>
-          <a:blip r:embed="rId17" cstate="email">
-            <a:extLst>
-              <a:ext uri="{28A0092B-C50C-407E-A947-70E740481C1C}">
-                <a14:useLocalDpi xmlns:a14="http://schemas.microsoft.com/office/drawing/2010/main"/>
-              </a:ext>
-            </a:extLst>
-          </a:blip>
-          <a:srcRect/>
-          <a:stretch>
-            <a:fillRect/>
-          </a:stretch>
-        </p:blipFill>
-        <p:spPr bwMode="auto">
-          <a:xfrm>
-            <a:off x="9333764" y="5286196"/>
-            <a:ext cx="2230073" cy="1136814"/>
-          </a:xfrm>
-          <a:prstGeom prst="rect">
-            <a:avLst/>
-          </a:prstGeom>
-          <a:noFill/>
-          <a:extLst>
-            <a:ext uri="{909E8E84-426E-40DD-AFC4-6F175D3DCCD1}">
-              <a14:hiddenFill xmlns:a14="http://schemas.microsoft.com/office/drawing/2010/main">
-                <a:solidFill>
-                  <a:srgbClr val="FFFFFF"/>
-                </a:solidFill>
-              </a14:hiddenFill>
-            </a:ext>
-          </a:extLst>
-        </p:spPr>
-      </p:pic>
-    </p:spTree>
-    <p:extLst>
-      <p:ext uri="{BB962C8B-B14F-4D97-AF65-F5344CB8AC3E}">
-        <p14:creationId xmlns:p14="http://schemas.microsoft.com/office/powerpoint/2010/main" val="879737350"/>
-      </p:ext>
-    </p:extLst>
-  </p:cSld>
-  <p:clrMapOvr>
-    <a:masterClrMapping/>
-  </p:clrMapOvr>
-</p:sld>
-</file>
-
-<file path=ppt/slides/slide2.xml><?xml version="1.0" encoding="utf-8"?>
-<p:sld xmlns:a="http://schemas.openxmlformats.org/drawingml/2006/main" xmlns:r="http://schemas.openxmlformats.org/officeDocument/2006/relationships" xmlns:p="http://schemas.openxmlformats.org/presentationml/2006/main">
-  <p:cSld>
-    <p:spTree>
-      <p:nvGrpSpPr>
-        <p:cNvPr id="1" name=""/>
-        <p:cNvGrpSpPr/>
-        <p:nvPr/>
-      </p:nvGrpSpPr>
-      <p:grpSpPr>
-        <a:xfrm>
-          <a:off x="0" y="0"/>
-          <a:ext cx="0" cy="0"/>
-          <a:chOff x="0" y="0"/>
-          <a:chExt cx="0" cy="0"/>
-        </a:xfrm>
-      </p:grpSpPr>
-      <p:graphicFrame>
-        <p:nvGraphicFramePr>
-          <p:cNvPr id="2" name="Table 2">
-            <a:extLst>
-              <a:ext uri="{FF2B5EF4-FFF2-40B4-BE49-F238E27FC236}">
-                <a16:creationId xmlns:a16="http://schemas.microsoft.com/office/drawing/2014/main" id="{7FCF282C-1FE0-6B4A-87A2-BB4E34AA6B80}"/>
-              </a:ext>
-            </a:extLst>
-          </p:cNvPr>
-          <p:cNvGraphicFramePr>
-            <a:graphicFrameLocks noGrp="1"/>
-          </p:cNvGraphicFramePr>
-          <p:nvPr>
-            <p:extLst>
-              <p:ext uri="{D42A27DB-BD31-4B8C-83A1-F6EECF244321}">
-                <p14:modId xmlns:p14="http://schemas.microsoft.com/office/powerpoint/2010/main" val="745608666"/>
-              </p:ext>
-            </p:extLst>
-          </p:nvPr>
-        </p:nvGraphicFramePr>
-        <p:xfrm>
-          <a:off x="0" y="0"/>
-          <a:ext cx="12192000" cy="6858000"/>
+          <a:off x="0" y="-3357154"/>
+          <a:ext cx="12192000" cy="10972800"/>
         </p:xfrm>
         <a:graphic>
           <a:graphicData uri="http://schemas.openxmlformats.org/drawingml/2006/table">
@@ -4511,16 +3616,157 @@
                   </a:ext>
                 </a:extLst>
               </a:tr>
+              <a:tr h="1371600">
+                <a:tc>
+                  <a:txBody>
+                    <a:bodyPr/>
+                    <a:lstStyle/>
+                    <a:p>
+                      <a:endParaRPr lang="en-KR"/>
+                    </a:p>
+                  </a:txBody>
+                  <a:tcPr/>
+                </a:tc>
+                <a:tc>
+                  <a:txBody>
+                    <a:bodyPr/>
+                    <a:lstStyle/>
+                    <a:p>
+                      <a:endParaRPr lang="en-KR" dirty="0"/>
+                    </a:p>
+                  </a:txBody>
+                  <a:tcPr/>
+                </a:tc>
+                <a:tc>
+                  <a:txBody>
+                    <a:bodyPr/>
+                    <a:lstStyle/>
+                    <a:p>
+                      <a:endParaRPr lang="en-KR" dirty="0"/>
+                    </a:p>
+                  </a:txBody>
+                  <a:tcPr/>
+                </a:tc>
+                <a:tc>
+                  <a:txBody>
+                    <a:bodyPr/>
+                    <a:lstStyle/>
+                    <a:p>
+                      <a:endParaRPr lang="en-KR" dirty="0"/>
+                    </a:p>
+                  </a:txBody>
+                  <a:tcPr/>
+                </a:tc>
+                <a:extLst>
+                  <a:ext uri="{0D108BD9-81ED-4DB2-BD59-A6C34878D82A}">
+                    <a16:rowId xmlns:a16="http://schemas.microsoft.com/office/drawing/2014/main" val="3494283209"/>
+                  </a:ext>
+                </a:extLst>
+              </a:tr>
+              <a:tr h="1371600">
+                <a:tc>
+                  <a:txBody>
+                    <a:bodyPr/>
+                    <a:lstStyle/>
+                    <a:p>
+                      <a:endParaRPr lang="en-KR"/>
+                    </a:p>
+                  </a:txBody>
+                  <a:tcPr/>
+                </a:tc>
+                <a:tc>
+                  <a:txBody>
+                    <a:bodyPr/>
+                    <a:lstStyle/>
+                    <a:p>
+                      <a:endParaRPr lang="en-KR" dirty="0"/>
+                    </a:p>
+                  </a:txBody>
+                  <a:tcPr/>
+                </a:tc>
+                <a:tc>
+                  <a:txBody>
+                    <a:bodyPr/>
+                    <a:lstStyle/>
+                    <a:p>
+                      <a:endParaRPr lang="en-KR" dirty="0"/>
+                    </a:p>
+                  </a:txBody>
+                  <a:tcPr/>
+                </a:tc>
+                <a:tc>
+                  <a:txBody>
+                    <a:bodyPr/>
+                    <a:lstStyle/>
+                    <a:p>
+                      <a:endParaRPr lang="en-KR" dirty="0"/>
+                    </a:p>
+                  </a:txBody>
+                  <a:tcPr/>
+                </a:tc>
+                <a:extLst>
+                  <a:ext uri="{0D108BD9-81ED-4DB2-BD59-A6C34878D82A}">
+                    <a16:rowId xmlns:a16="http://schemas.microsoft.com/office/drawing/2014/main" val="2953121858"/>
+                  </a:ext>
+                </a:extLst>
+              </a:tr>
+              <a:tr h="1371600">
+                <a:tc>
+                  <a:txBody>
+                    <a:bodyPr/>
+                    <a:lstStyle/>
+                    <a:p>
+                      <a:endParaRPr lang="en-KR"/>
+                    </a:p>
+                  </a:txBody>
+                  <a:tcPr/>
+                </a:tc>
+                <a:tc>
+                  <a:txBody>
+                    <a:bodyPr/>
+                    <a:lstStyle/>
+                    <a:p>
+                      <a:endParaRPr lang="en-KR" dirty="0"/>
+                    </a:p>
+                  </a:txBody>
+                  <a:tcPr/>
+                </a:tc>
+                <a:tc>
+                  <a:txBody>
+                    <a:bodyPr/>
+                    <a:lstStyle/>
+                    <a:p>
+                      <a:endParaRPr lang="en-KR" dirty="0"/>
+                    </a:p>
+                  </a:txBody>
+                  <a:tcPr/>
+                </a:tc>
+                <a:tc>
+                  <a:txBody>
+                    <a:bodyPr/>
+                    <a:lstStyle/>
+                    <a:p>
+                      <a:endParaRPr lang="en-KR" dirty="0"/>
+                    </a:p>
+                  </a:txBody>
+                  <a:tcPr/>
+                </a:tc>
+                <a:extLst>
+                  <a:ext uri="{0D108BD9-81ED-4DB2-BD59-A6C34878D82A}">
+                    <a16:rowId xmlns:a16="http://schemas.microsoft.com/office/drawing/2014/main" val="1285290908"/>
+                  </a:ext>
+                </a:extLst>
+              </a:tr>
             </a:tbl>
           </a:graphicData>
         </a:graphic>
       </p:graphicFrame>
       <p:pic>
         <p:nvPicPr>
-          <p:cNvPr id="20" name="Picture 19">
-            <a:extLst>
-              <a:ext uri="{FF2B5EF4-FFF2-40B4-BE49-F238E27FC236}">
-                <a16:creationId xmlns:a16="http://schemas.microsoft.com/office/drawing/2014/main" id="{C8D8A3BB-A315-4843-9192-8B7C90007206}"/>
+          <p:cNvPr id="8" name="그림 7">
+            <a:extLst>
+              <a:ext uri="{FF2B5EF4-FFF2-40B4-BE49-F238E27FC236}">
+                <a16:creationId xmlns:a16="http://schemas.microsoft.com/office/drawing/2014/main" id="{C65AB2E4-F8CB-C301-F2DB-F6E042D0F5E8}"/>
               </a:ext>
             </a:extLst>
           </p:cNvPr>
@@ -4530,15 +3776,21 @@
           <p:nvPr/>
         </p:nvPicPr>
         <p:blipFill>
-          <a:blip r:embed="rId2"/>
+          <a:blip r:embed="rId2" cstate="email">
+            <a:extLst>
+              <a:ext uri="{28A0092B-C50C-407E-A947-70E740481C1C}">
+                <a14:useLocalDpi xmlns:a14="http://schemas.microsoft.com/office/drawing/2010/main"/>
+              </a:ext>
+            </a:extLst>
+          </a:blip>
           <a:stretch>
             <a:fillRect/>
           </a:stretch>
         </p:blipFill>
         <p:spPr>
           <a:xfrm>
-            <a:off x="396402" y="211577"/>
-            <a:ext cx="2438400" cy="914400"/>
+            <a:off x="6522900" y="-3119551"/>
+            <a:ext cx="2547438" cy="897994"/>
           </a:xfrm>
           <a:prstGeom prst="rect">
             <a:avLst/>
@@ -4547,10 +3799,10 @@
       </p:pic>
       <p:pic>
         <p:nvPicPr>
-          <p:cNvPr id="21" name="그림 16">
-            <a:extLst>
-              <a:ext uri="{FF2B5EF4-FFF2-40B4-BE49-F238E27FC236}">
-                <a16:creationId xmlns:a16="http://schemas.microsoft.com/office/drawing/2014/main" id="{0C70F9D8-AECB-B643-AC53-6BDEFD9660D9}"/>
+          <p:cNvPr id="9" name="그림 8">
+            <a:extLst>
+              <a:ext uri="{FF2B5EF4-FFF2-40B4-BE49-F238E27FC236}">
+                <a16:creationId xmlns:a16="http://schemas.microsoft.com/office/drawing/2014/main" id="{087B06A0-DDA4-70EA-2D86-F9CDABF38C1A}"/>
               </a:ext>
             </a:extLst>
           </p:cNvPr>
@@ -4560,15 +3812,21 @@
           <p:nvPr/>
         </p:nvPicPr>
         <p:blipFill>
-          <a:blip r:embed="rId3"/>
+          <a:blip r:embed="rId3" cstate="email">
+            <a:extLst>
+              <a:ext uri="{28A0092B-C50C-407E-A947-70E740481C1C}">
+                <a14:useLocalDpi xmlns:a14="http://schemas.microsoft.com/office/drawing/2010/main"/>
+              </a:ext>
+            </a:extLst>
+          </a:blip>
           <a:stretch>
             <a:fillRect/>
           </a:stretch>
         </p:blipFill>
         <p:spPr>
           <a:xfrm>
-            <a:off x="3139602" y="429781"/>
-            <a:ext cx="2880360" cy="477991"/>
+            <a:off x="107574" y="-3107142"/>
+            <a:ext cx="2541114" cy="741613"/>
           </a:xfrm>
           <a:prstGeom prst="rect">
             <a:avLst/>
@@ -4577,10 +3835,10 @@
       </p:pic>
       <p:pic>
         <p:nvPicPr>
-          <p:cNvPr id="22" name="Picture 21">
-            <a:extLst>
-              <a:ext uri="{FF2B5EF4-FFF2-40B4-BE49-F238E27FC236}">
-                <a16:creationId xmlns:a16="http://schemas.microsoft.com/office/drawing/2014/main" id="{D8B7F372-9939-1C44-BDB1-E2B0E94BAA1D}"/>
+          <p:cNvPr id="10" name="그림 9">
+            <a:extLst>
+              <a:ext uri="{FF2B5EF4-FFF2-40B4-BE49-F238E27FC236}">
+                <a16:creationId xmlns:a16="http://schemas.microsoft.com/office/drawing/2014/main" id="{DFF2FA41-2471-EA04-07A3-049B0E154811}"/>
               </a:ext>
             </a:extLst>
           </p:cNvPr>
@@ -4590,15 +3848,21 @@
           <p:nvPr/>
         </p:nvPicPr>
         <p:blipFill>
-          <a:blip r:embed="rId4"/>
+          <a:blip r:embed="rId4" cstate="email">
+            <a:extLst>
+              <a:ext uri="{28A0092B-C50C-407E-A947-70E740481C1C}">
+                <a14:useLocalDpi xmlns:a14="http://schemas.microsoft.com/office/drawing/2010/main"/>
+              </a:ext>
+            </a:extLst>
+          </a:blip>
           <a:stretch>
             <a:fillRect/>
           </a:stretch>
         </p:blipFill>
         <p:spPr>
           <a:xfrm>
-            <a:off x="6276502" y="264916"/>
-            <a:ext cx="2692400" cy="807720"/>
+            <a:off x="2756262" y="-2975578"/>
+            <a:ext cx="3531507" cy="610049"/>
           </a:xfrm>
           <a:prstGeom prst="rect">
             <a:avLst/>
@@ -4607,10 +3871,10 @@
       </p:pic>
       <p:pic>
         <p:nvPicPr>
-          <p:cNvPr id="23" name="Picture 22">
-            <a:extLst>
-              <a:ext uri="{FF2B5EF4-FFF2-40B4-BE49-F238E27FC236}">
-                <a16:creationId xmlns:a16="http://schemas.microsoft.com/office/drawing/2014/main" id="{B2A7E2CC-965A-4C48-AE11-696AD5BE9557}"/>
+          <p:cNvPr id="11" name="Picture 28">
+            <a:extLst>
+              <a:ext uri="{FF2B5EF4-FFF2-40B4-BE49-F238E27FC236}">
+                <a16:creationId xmlns:a16="http://schemas.microsoft.com/office/drawing/2014/main" id="{EAA4288E-7BBA-9D37-74C5-E7D01265AC4C}"/>
               </a:ext>
             </a:extLst>
           </p:cNvPr>
@@ -4620,15 +3884,21 @@
           <p:nvPr/>
         </p:nvPicPr>
         <p:blipFill>
-          <a:blip r:embed="rId5"/>
+          <a:blip r:embed="rId5" cstate="email">
+            <a:extLst>
+              <a:ext uri="{28A0092B-C50C-407E-A947-70E740481C1C}">
+                <a14:useLocalDpi xmlns:a14="http://schemas.microsoft.com/office/drawing/2010/main"/>
+              </a:ext>
+            </a:extLst>
+          </a:blip>
           <a:stretch>
             <a:fillRect/>
           </a:stretch>
         </p:blipFill>
         <p:spPr>
           <a:xfrm>
-            <a:off x="9275708" y="232796"/>
-            <a:ext cx="2667000" cy="941647"/>
+            <a:off x="9814930" y="-3373898"/>
+            <a:ext cx="1710337" cy="1406691"/>
           </a:xfrm>
           <a:prstGeom prst="rect">
             <a:avLst/>
@@ -4637,10 +3907,10 @@
       </p:pic>
       <p:pic>
         <p:nvPicPr>
-          <p:cNvPr id="24" name="그림 5">
-            <a:extLst>
-              <a:ext uri="{FF2B5EF4-FFF2-40B4-BE49-F238E27FC236}">
-                <a16:creationId xmlns:a16="http://schemas.microsoft.com/office/drawing/2014/main" id="{99A22A7B-2B39-F444-87CF-D942FA5EFAAA}"/>
+          <p:cNvPr id="12" name="Picture 19">
+            <a:extLst>
+              <a:ext uri="{FF2B5EF4-FFF2-40B4-BE49-F238E27FC236}">
+                <a16:creationId xmlns:a16="http://schemas.microsoft.com/office/drawing/2014/main" id="{B9B914B5-3A95-CB46-A724-6FC75F85C45A}"/>
               </a:ext>
             </a:extLst>
           </p:cNvPr>
@@ -4650,15 +3920,21 @@
           <p:nvPr/>
         </p:nvPicPr>
         <p:blipFill>
-          <a:blip r:embed="rId6"/>
+          <a:blip r:embed="rId6" cstate="email">
+            <a:extLst>
+              <a:ext uri="{28A0092B-C50C-407E-A947-70E740481C1C}">
+                <a14:useLocalDpi xmlns:a14="http://schemas.microsoft.com/office/drawing/2010/main"/>
+              </a:ext>
+            </a:extLst>
+          </a:blip>
           <a:stretch>
             <a:fillRect/>
           </a:stretch>
         </p:blipFill>
         <p:spPr>
           <a:xfrm>
-            <a:off x="325950" y="1549492"/>
-            <a:ext cx="2387373" cy="1016844"/>
+            <a:off x="3352800" y="-1803835"/>
+            <a:ext cx="2438400" cy="914400"/>
           </a:xfrm>
           <a:prstGeom prst="rect">
             <a:avLst/>
@@ -4667,10 +3943,10 @@
       </p:pic>
       <p:pic>
         <p:nvPicPr>
-          <p:cNvPr id="26" name="Picture 25">
-            <a:extLst>
-              <a:ext uri="{FF2B5EF4-FFF2-40B4-BE49-F238E27FC236}">
-                <a16:creationId xmlns:a16="http://schemas.microsoft.com/office/drawing/2014/main" id="{2CE40AB1-6456-204B-8528-90EF22A94915}"/>
+          <p:cNvPr id="13" name="그림 16">
+            <a:extLst>
+              <a:ext uri="{FF2B5EF4-FFF2-40B4-BE49-F238E27FC236}">
+                <a16:creationId xmlns:a16="http://schemas.microsoft.com/office/drawing/2014/main" id="{689C22E3-9FC9-6AF8-6317-59ACC44AD87A}"/>
               </a:ext>
             </a:extLst>
           </p:cNvPr>
@@ -4680,15 +3956,21 @@
           <p:nvPr/>
         </p:nvPicPr>
         <p:blipFill>
-          <a:blip r:embed="rId7"/>
+          <a:blip r:embed="rId7" cstate="email">
+            <a:extLst>
+              <a:ext uri="{28A0092B-C50C-407E-A947-70E740481C1C}">
+                <a14:useLocalDpi xmlns:a14="http://schemas.microsoft.com/office/drawing/2010/main"/>
+              </a:ext>
+            </a:extLst>
+          </a:blip>
           <a:stretch>
             <a:fillRect/>
           </a:stretch>
         </p:blipFill>
         <p:spPr>
           <a:xfrm>
-            <a:off x="3139602" y="1707681"/>
-            <a:ext cx="2880360" cy="700465"/>
+            <a:off x="6096000" y="-1585631"/>
+            <a:ext cx="2880360" cy="477991"/>
           </a:xfrm>
           <a:prstGeom prst="rect">
             <a:avLst/>
@@ -4697,10 +3979,184 @@
       </p:pic>
       <p:pic>
         <p:nvPicPr>
-          <p:cNvPr id="27" name="Picture 10" descr="Koh Young Technology - 2020년 전문연구요원 모집">
-            <a:extLst>
-              <a:ext uri="{FF2B5EF4-FFF2-40B4-BE49-F238E27FC236}">
-                <a16:creationId xmlns:a16="http://schemas.microsoft.com/office/drawing/2014/main" id="{1D36A79E-B117-4D43-95C5-22B27EE8E89C}"/>
+          <p:cNvPr id="14" name="Picture 21">
+            <a:extLst>
+              <a:ext uri="{FF2B5EF4-FFF2-40B4-BE49-F238E27FC236}">
+                <a16:creationId xmlns:a16="http://schemas.microsoft.com/office/drawing/2014/main" id="{186BEFEA-6707-443B-8933-D4B2F2E14019}"/>
+              </a:ext>
+            </a:extLst>
+          </p:cNvPr>
+          <p:cNvPicPr>
+            <a:picLocks noChangeAspect="1"/>
+          </p:cNvPicPr>
+          <p:nvPr/>
+        </p:nvPicPr>
+        <p:blipFill>
+          <a:blip r:embed="rId8" cstate="email">
+            <a:extLst>
+              <a:ext uri="{28A0092B-C50C-407E-A947-70E740481C1C}">
+                <a14:useLocalDpi xmlns:a14="http://schemas.microsoft.com/office/drawing/2010/main"/>
+              </a:ext>
+            </a:extLst>
+          </a:blip>
+          <a:stretch>
+            <a:fillRect/>
+          </a:stretch>
+        </p:blipFill>
+        <p:spPr>
+          <a:xfrm>
+            <a:off x="9232900" y="-1750496"/>
+            <a:ext cx="2692400" cy="807720"/>
+          </a:xfrm>
+          <a:prstGeom prst="rect">
+            <a:avLst/>
+          </a:prstGeom>
+        </p:spPr>
+      </p:pic>
+      <p:pic>
+        <p:nvPicPr>
+          <p:cNvPr id="15" name="Picture 4">
+            <a:extLst>
+              <a:ext uri="{FF2B5EF4-FFF2-40B4-BE49-F238E27FC236}">
+                <a16:creationId xmlns:a16="http://schemas.microsoft.com/office/drawing/2014/main" id="{F33D6315-1718-5C4F-DECF-93D4F64860E2}"/>
+              </a:ext>
+            </a:extLst>
+          </p:cNvPr>
+          <p:cNvPicPr>
+            <a:picLocks noChangeAspect="1"/>
+          </p:cNvPicPr>
+          <p:nvPr/>
+        </p:nvPicPr>
+        <p:blipFill>
+          <a:blip r:embed="rId9" cstate="email">
+            <a:extLst>
+              <a:ext uri="{28A0092B-C50C-407E-A947-70E740481C1C}">
+                <a14:useLocalDpi xmlns:a14="http://schemas.microsoft.com/office/drawing/2010/main"/>
+              </a:ext>
+            </a:extLst>
+          </a:blip>
+          <a:stretch>
+            <a:fillRect/>
+          </a:stretch>
+        </p:blipFill>
+        <p:spPr>
+          <a:xfrm>
+            <a:off x="810723" y="-1949406"/>
+            <a:ext cx="1416909" cy="1247092"/>
+          </a:xfrm>
+          <a:prstGeom prst="rect">
+            <a:avLst/>
+          </a:prstGeom>
+        </p:spPr>
+      </p:pic>
+      <p:pic>
+        <p:nvPicPr>
+          <p:cNvPr id="16" name="Picture 22">
+            <a:extLst>
+              <a:ext uri="{FF2B5EF4-FFF2-40B4-BE49-F238E27FC236}">
+                <a16:creationId xmlns:a16="http://schemas.microsoft.com/office/drawing/2014/main" id="{59D5F6C6-2D64-ED92-71F3-75AEA8C90536}"/>
+              </a:ext>
+            </a:extLst>
+          </p:cNvPr>
+          <p:cNvPicPr>
+            <a:picLocks noChangeAspect="1"/>
+          </p:cNvPicPr>
+          <p:nvPr/>
+        </p:nvPicPr>
+        <p:blipFill>
+          <a:blip r:embed="rId10" cstate="email">
+            <a:extLst>
+              <a:ext uri="{28A0092B-C50C-407E-A947-70E740481C1C}">
+                <a14:useLocalDpi xmlns:a14="http://schemas.microsoft.com/office/drawing/2010/main"/>
+              </a:ext>
+            </a:extLst>
+          </a:blip>
+          <a:stretch>
+            <a:fillRect/>
+          </a:stretch>
+        </p:blipFill>
+        <p:spPr>
+          <a:xfrm>
+            <a:off x="306995" y="-423799"/>
+            <a:ext cx="2667000" cy="941647"/>
+          </a:xfrm>
+          <a:prstGeom prst="rect">
+            <a:avLst/>
+          </a:prstGeom>
+        </p:spPr>
+      </p:pic>
+      <p:pic>
+        <p:nvPicPr>
+          <p:cNvPr id="17" name="그림 5">
+            <a:extLst>
+              <a:ext uri="{FF2B5EF4-FFF2-40B4-BE49-F238E27FC236}">
+                <a16:creationId xmlns:a16="http://schemas.microsoft.com/office/drawing/2014/main" id="{1E13A434-1D4D-38B3-0F43-007E18E41517}"/>
+              </a:ext>
+            </a:extLst>
+          </p:cNvPr>
+          <p:cNvPicPr>
+            <a:picLocks noChangeAspect="1"/>
+          </p:cNvPicPr>
+          <p:nvPr/>
+        </p:nvPicPr>
+        <p:blipFill>
+          <a:blip r:embed="rId11"/>
+          <a:stretch>
+            <a:fillRect/>
+          </a:stretch>
+        </p:blipFill>
+        <p:spPr>
+          <a:xfrm>
+            <a:off x="3474117" y="-444380"/>
+            <a:ext cx="2387373" cy="1016844"/>
+          </a:xfrm>
+          <a:prstGeom prst="rect">
+            <a:avLst/>
+          </a:prstGeom>
+        </p:spPr>
+      </p:pic>
+      <p:pic>
+        <p:nvPicPr>
+          <p:cNvPr id="18" name="Picture 25">
+            <a:extLst>
+              <a:ext uri="{FF2B5EF4-FFF2-40B4-BE49-F238E27FC236}">
+                <a16:creationId xmlns:a16="http://schemas.microsoft.com/office/drawing/2014/main" id="{0E1DE2C8-FB23-E27C-CDB4-F6420DBD834A}"/>
+              </a:ext>
+            </a:extLst>
+          </p:cNvPr>
+          <p:cNvPicPr>
+            <a:picLocks noChangeAspect="1"/>
+          </p:cNvPicPr>
+          <p:nvPr/>
+        </p:nvPicPr>
+        <p:blipFill>
+          <a:blip r:embed="rId12" cstate="email">
+            <a:extLst>
+              <a:ext uri="{28A0092B-C50C-407E-A947-70E740481C1C}">
+                <a14:useLocalDpi xmlns:a14="http://schemas.microsoft.com/office/drawing/2010/main"/>
+              </a:ext>
+            </a:extLst>
+          </a:blip>
+          <a:stretch>
+            <a:fillRect/>
+          </a:stretch>
+        </p:blipFill>
+        <p:spPr>
+          <a:xfrm>
+            <a:off x="6287769" y="-286191"/>
+            <a:ext cx="2880360" cy="700465"/>
+          </a:xfrm>
+          <a:prstGeom prst="rect">
+            <a:avLst/>
+          </a:prstGeom>
+        </p:spPr>
+      </p:pic>
+      <p:pic>
+        <p:nvPicPr>
+          <p:cNvPr id="19" name="Picture 10" descr="Koh Young Technology - 2020년 전문연구요원 모집">
+            <a:extLst>
+              <a:ext uri="{FF2B5EF4-FFF2-40B4-BE49-F238E27FC236}">
+                <a16:creationId xmlns:a16="http://schemas.microsoft.com/office/drawing/2014/main" id="{918BF1C3-6774-3E1D-344E-189958483252}"/>
               </a:ext>
             </a:extLst>
           </p:cNvPr>
@@ -4710,10 +4166,10 @@
           <p:nvPr/>
         </p:nvPicPr>
         <p:blipFill>
-          <a:blip r:embed="rId8">
+          <a:blip r:embed="rId13" cstate="email">
             <a:extLst>
               <a:ext uri="{28A0092B-C50C-407E-A947-70E740481C1C}">
-                <a14:useLocalDpi xmlns:a14="http://schemas.microsoft.com/office/drawing/2010/main" val="0"/>
+                <a14:useLocalDpi xmlns:a14="http://schemas.microsoft.com/office/drawing/2010/main"/>
               </a:ext>
             </a:extLst>
           </a:blip>
@@ -4724,8 +4180,8 @@
         </p:blipFill>
         <p:spPr bwMode="auto">
           <a:xfrm>
-            <a:off x="9591538" y="1427429"/>
-            <a:ext cx="2118811" cy="1260967"/>
+            <a:off x="9490379" y="-646254"/>
+            <a:ext cx="2387025" cy="1420589"/>
           </a:xfrm>
           <a:prstGeom prst="rect">
             <a:avLst/>
@@ -4744,10 +4200,10 @@
       </p:pic>
       <p:pic>
         <p:nvPicPr>
-          <p:cNvPr id="28" name="그림 7">
-            <a:extLst>
-              <a:ext uri="{FF2B5EF4-FFF2-40B4-BE49-F238E27FC236}">
-                <a16:creationId xmlns:a16="http://schemas.microsoft.com/office/drawing/2014/main" id="{3606F132-6404-0C4D-997C-E843E8DDE0C8}"/>
+          <p:cNvPr id="25" name="그림 7">
+            <a:extLst>
+              <a:ext uri="{FF2B5EF4-FFF2-40B4-BE49-F238E27FC236}">
+                <a16:creationId xmlns:a16="http://schemas.microsoft.com/office/drawing/2014/main" id="{EEFD313E-451E-68CC-66AF-7F4175449819}"/>
               </a:ext>
             </a:extLst>
           </p:cNvPr>
@@ -4757,14 +4213,20 @@
           <p:nvPr/>
         </p:nvPicPr>
         <p:blipFill>
-          <a:blip r:embed="rId9"/>
+          <a:blip r:embed="rId14" cstate="email">
+            <a:extLst>
+              <a:ext uri="{28A0092B-C50C-407E-A947-70E740481C1C}">
+                <a14:useLocalDpi xmlns:a14="http://schemas.microsoft.com/office/drawing/2010/main"/>
+              </a:ext>
+            </a:extLst>
+          </a:blip>
           <a:stretch>
             <a:fillRect/>
           </a:stretch>
         </p:blipFill>
         <p:spPr>
           <a:xfrm>
-            <a:off x="965045" y="2943684"/>
+            <a:off x="909952" y="956191"/>
             <a:ext cx="1154717" cy="970631"/>
           </a:xfrm>
           <a:prstGeom prst="rect">
@@ -4774,10 +4236,10 @@
       </p:pic>
       <p:pic>
         <p:nvPicPr>
-          <p:cNvPr id="29" name="Picture 28">
-            <a:extLst>
-              <a:ext uri="{FF2B5EF4-FFF2-40B4-BE49-F238E27FC236}">
-                <a16:creationId xmlns:a16="http://schemas.microsoft.com/office/drawing/2014/main" id="{613EED19-8BFE-7F41-AA99-DEDEC5D69CC2}"/>
+          <p:cNvPr id="34" name="그림 11">
+            <a:extLst>
+              <a:ext uri="{FF2B5EF4-FFF2-40B4-BE49-F238E27FC236}">
+                <a16:creationId xmlns:a16="http://schemas.microsoft.com/office/drawing/2014/main" id="{B0726CA1-1E17-BD14-C6D4-4CEFEEB38D19}"/>
               </a:ext>
             </a:extLst>
           </p:cNvPr>
@@ -4787,7 +4249,7 @@
           <p:nvPr/>
         </p:nvPicPr>
         <p:blipFill>
-          <a:blip r:embed="rId10" cstate="email">
+          <a:blip r:embed="rId15" cstate="email">
             <a:extLst>
               <a:ext uri="{28A0092B-C50C-407E-A947-70E740481C1C}">
                 <a14:useLocalDpi xmlns:a14="http://schemas.microsoft.com/office/drawing/2010/main"/>
@@ -4800,8 +4262,8 @@
         </p:blipFill>
         <p:spPr>
           <a:xfrm>
-            <a:off x="6770450" y="1337552"/>
-            <a:ext cx="1710337" cy="1406691"/>
+            <a:off x="3315891" y="952564"/>
+            <a:ext cx="2421785" cy="915174"/>
           </a:xfrm>
           <a:prstGeom prst="rect">
             <a:avLst/>
@@ -4810,46 +4272,10 @@
       </p:pic>
       <p:pic>
         <p:nvPicPr>
-          <p:cNvPr id="30" name="그림 11">
-            <a:extLst>
-              <a:ext uri="{FF2B5EF4-FFF2-40B4-BE49-F238E27FC236}">
-                <a16:creationId xmlns:a16="http://schemas.microsoft.com/office/drawing/2014/main" id="{6345D305-77DB-044B-8C53-8EE3A0C2A555}"/>
-              </a:ext>
-            </a:extLst>
-          </p:cNvPr>
-          <p:cNvPicPr>
-            <a:picLocks noChangeAspect="1"/>
-          </p:cNvPicPr>
-          <p:nvPr/>
-        </p:nvPicPr>
-        <p:blipFill>
-          <a:blip r:embed="rId11">
-            <a:extLst>
-              <a:ext uri="{28A0092B-C50C-407E-A947-70E740481C1C}">
-                <a14:useLocalDpi xmlns:a14="http://schemas.microsoft.com/office/drawing/2010/main" val="0"/>
-              </a:ext>
-            </a:extLst>
-          </a:blip>
-          <a:stretch>
-            <a:fillRect/>
-          </a:stretch>
-        </p:blipFill>
-        <p:spPr>
-          <a:xfrm>
-            <a:off x="3370984" y="2940057"/>
-            <a:ext cx="2421785" cy="915174"/>
-          </a:xfrm>
-          <a:prstGeom prst="rect">
-            <a:avLst/>
-          </a:prstGeom>
-        </p:spPr>
-      </p:pic>
-      <p:pic>
-        <p:nvPicPr>
-          <p:cNvPr id="31" name="Picture 26" descr="라인플러스 기업정보 보기">
-            <a:extLst>
-              <a:ext uri="{FF2B5EF4-FFF2-40B4-BE49-F238E27FC236}">
-                <a16:creationId xmlns:a16="http://schemas.microsoft.com/office/drawing/2014/main" id="{18C65C2F-682C-974F-BD11-57A3CD7CEC2A}"/>
+          <p:cNvPr id="36" name="Picture 30" descr="LG전자 (엘지) 로고">
+            <a:extLst>
+              <a:ext uri="{FF2B5EF4-FFF2-40B4-BE49-F238E27FC236}">
+                <a16:creationId xmlns:a16="http://schemas.microsoft.com/office/drawing/2014/main" id="{A4369F3C-FF10-1B3D-99C0-6B8F03A42990}"/>
               </a:ext>
             </a:extLst>
           </p:cNvPr>
@@ -4859,10 +4285,10 @@
           <p:nvPr/>
         </p:nvPicPr>
         <p:blipFill>
-          <a:blip r:embed="rId12">
+          <a:blip r:embed="rId16" cstate="email">
             <a:extLst>
               <a:ext uri="{28A0092B-C50C-407E-A947-70E740481C1C}">
-                <a14:useLocalDpi xmlns:a14="http://schemas.microsoft.com/office/drawing/2010/main" val="0"/>
+                <a14:useLocalDpi xmlns:a14="http://schemas.microsoft.com/office/drawing/2010/main"/>
               </a:ext>
             </a:extLst>
           </a:blip>
@@ -4873,8 +4299,8 @@
         </p:blipFill>
         <p:spPr bwMode="auto">
           <a:xfrm>
-            <a:off x="9553389" y="3045277"/>
-            <a:ext cx="2195110" cy="767441"/>
+            <a:off x="5876730" y="1003218"/>
+            <a:ext cx="3680750" cy="807720"/>
           </a:xfrm>
           <a:prstGeom prst="rect">
             <a:avLst/>
@@ -4893,10 +4319,10 @@
       </p:pic>
       <p:pic>
         <p:nvPicPr>
-          <p:cNvPr id="32" name="Picture 30" descr="LG전자 (엘지) 로고">
-            <a:extLst>
-              <a:ext uri="{FF2B5EF4-FFF2-40B4-BE49-F238E27FC236}">
-                <a16:creationId xmlns:a16="http://schemas.microsoft.com/office/drawing/2014/main" id="{9ECF1BB6-CF62-E045-8E30-20880B8BFA23}"/>
+          <p:cNvPr id="37" name="Picture 26" descr="라인플러스 기업정보 보기">
+            <a:extLst>
+              <a:ext uri="{FF2B5EF4-FFF2-40B4-BE49-F238E27FC236}">
+                <a16:creationId xmlns:a16="http://schemas.microsoft.com/office/drawing/2014/main" id="{279F445E-9306-A749-460C-236578D66457}"/>
               </a:ext>
             </a:extLst>
           </p:cNvPr>
@@ -4906,10 +4332,10 @@
           <p:nvPr/>
         </p:nvPicPr>
         <p:blipFill>
-          <a:blip r:embed="rId13">
+          <a:blip r:embed="rId17" cstate="email">
             <a:extLst>
               <a:ext uri="{28A0092B-C50C-407E-A947-70E740481C1C}">
-                <a14:useLocalDpi xmlns:a14="http://schemas.microsoft.com/office/drawing/2010/main" val="0"/>
+                <a14:useLocalDpi xmlns:a14="http://schemas.microsoft.com/office/drawing/2010/main"/>
               </a:ext>
             </a:extLst>
           </a:blip>
@@ -4920,8 +4346,8 @@
         </p:blipFill>
         <p:spPr bwMode="auto">
           <a:xfrm>
-            <a:off x="6096000" y="3078766"/>
-            <a:ext cx="3191993" cy="700465"/>
+            <a:off x="9586336" y="1043497"/>
+            <a:ext cx="2195110" cy="767441"/>
           </a:xfrm>
           <a:prstGeom prst="rect">
             <a:avLst/>
@@ -4940,10 +4366,10 @@
       </p:pic>
       <p:pic>
         <p:nvPicPr>
-          <p:cNvPr id="33" name="Picture 4">
-            <a:extLst>
-              <a:ext uri="{FF2B5EF4-FFF2-40B4-BE49-F238E27FC236}">
-                <a16:creationId xmlns:a16="http://schemas.microsoft.com/office/drawing/2014/main" id="{FD52486A-2809-7943-B331-D672480B10E9}"/>
+          <p:cNvPr id="38" name="Picture 4">
+            <a:extLst>
+              <a:ext uri="{FF2B5EF4-FFF2-40B4-BE49-F238E27FC236}">
+                <a16:creationId xmlns:a16="http://schemas.microsoft.com/office/drawing/2014/main" id="{5EB4D0BD-9957-9DBD-470A-C38BC06C006A}"/>
               </a:ext>
             </a:extLst>
           </p:cNvPr>
@@ -4953,7 +4379,7 @@
           <p:nvPr/>
         </p:nvPicPr>
         <p:blipFill>
-          <a:blip r:embed="rId14" cstate="email">
+          <a:blip r:embed="rId18" cstate="email">
             <a:extLst>
               <a:ext uri="{28A0092B-C50C-407E-A947-70E740481C1C}">
                 <a14:useLocalDpi xmlns:a14="http://schemas.microsoft.com/office/drawing/2010/main"/>
@@ -4967,7 +4393,7 @@
         </p:blipFill>
         <p:spPr bwMode="auto">
           <a:xfrm>
-            <a:off x="663565" y="4337877"/>
+            <a:off x="567140" y="2361269"/>
             <a:ext cx="1904074" cy="970631"/>
           </a:xfrm>
           <a:prstGeom prst="rect">
@@ -4987,10 +4413,10 @@
       </p:pic>
       <p:pic>
         <p:nvPicPr>
-          <p:cNvPr id="34" name="Picture 18" descr="File:Samsung wordmark.svg">
-            <a:extLst>
-              <a:ext uri="{FF2B5EF4-FFF2-40B4-BE49-F238E27FC236}">
-                <a16:creationId xmlns:a16="http://schemas.microsoft.com/office/drawing/2014/main" id="{4C530BC6-014B-284F-B512-26A96E2AD586}"/>
+          <p:cNvPr id="39" name="Picture 28" descr="image.fnnews.com/resource/media/image/2020/01/0...">
+            <a:extLst>
+              <a:ext uri="{FF2B5EF4-FFF2-40B4-BE49-F238E27FC236}">
+                <a16:creationId xmlns:a16="http://schemas.microsoft.com/office/drawing/2014/main" id="{5DB1CD15-26FF-7CF5-C3F8-237F32CD3567}"/>
               </a:ext>
             </a:extLst>
           </p:cNvPr>
@@ -5000,10 +4426,10 @@
           <p:nvPr/>
         </p:nvPicPr>
         <p:blipFill>
-          <a:blip r:embed="rId15">
+          <a:blip r:embed="rId19" cstate="email">
             <a:extLst>
               <a:ext uri="{28A0092B-C50C-407E-A947-70E740481C1C}">
-                <a14:useLocalDpi xmlns:a14="http://schemas.microsoft.com/office/drawing/2010/main" val="0"/>
+                <a14:useLocalDpi xmlns:a14="http://schemas.microsoft.com/office/drawing/2010/main"/>
               </a:ext>
             </a:extLst>
           </a:blip>
@@ -5014,8 +4440,8 @@
         </p:blipFill>
         <p:spPr bwMode="auto">
           <a:xfrm>
-            <a:off x="6141010" y="4568732"/>
-            <a:ext cx="2858509" cy="438304"/>
+            <a:off x="6799866" y="2193141"/>
+            <a:ext cx="1834478" cy="1235859"/>
           </a:xfrm>
           <a:prstGeom prst="rect">
             <a:avLst/>
@@ -5034,10 +4460,112 @@
       </p:pic>
       <p:pic>
         <p:nvPicPr>
-          <p:cNvPr id="35" name="Picture 28" descr="image.fnnews.com/resource/media/image/2020/01/0...">
-            <a:extLst>
-              <a:ext uri="{FF2B5EF4-FFF2-40B4-BE49-F238E27FC236}">
-                <a16:creationId xmlns:a16="http://schemas.microsoft.com/office/drawing/2014/main" id="{C1F7B736-09FE-3144-A90D-1D9F7E8AA714}"/>
+          <p:cNvPr id="40" name="Picture 2">
+            <a:extLst>
+              <a:ext uri="{FF2B5EF4-FFF2-40B4-BE49-F238E27FC236}">
+                <a16:creationId xmlns:a16="http://schemas.microsoft.com/office/drawing/2014/main" id="{F8E798B1-BF6B-57F4-8BC5-FBE909F63238}"/>
+              </a:ext>
+            </a:extLst>
+          </p:cNvPr>
+          <p:cNvPicPr>
+            <a:picLocks noChangeAspect="1"/>
+          </p:cNvPicPr>
+          <p:nvPr/>
+        </p:nvPicPr>
+        <p:blipFill>
+          <a:blip r:embed="rId20"/>
+          <a:stretch>
+            <a:fillRect/>
+          </a:stretch>
+        </p:blipFill>
+        <p:spPr>
+          <a:xfrm>
+            <a:off x="56399" y="3900765"/>
+            <a:ext cx="2925555" cy="539464"/>
+          </a:xfrm>
+          <a:prstGeom prst="rect">
+            <a:avLst/>
+          </a:prstGeom>
+        </p:spPr>
+      </p:pic>
+      <p:pic>
+        <p:nvPicPr>
+          <p:cNvPr id="41" name="Picture 3">
+            <a:extLst>
+              <a:ext uri="{FF2B5EF4-FFF2-40B4-BE49-F238E27FC236}">
+                <a16:creationId xmlns:a16="http://schemas.microsoft.com/office/drawing/2014/main" id="{61E7FB33-812F-2DB5-B235-8A52B7C91CB8}"/>
+              </a:ext>
+            </a:extLst>
+          </p:cNvPr>
+          <p:cNvPicPr>
+            <a:picLocks noChangeAspect="1"/>
+          </p:cNvPicPr>
+          <p:nvPr/>
+        </p:nvPicPr>
+        <p:blipFill>
+          <a:blip r:embed="rId21" cstate="email">
+            <a:extLst>
+              <a:ext uri="{28A0092B-C50C-407E-A947-70E740481C1C}">
+                <a14:useLocalDpi xmlns:a14="http://schemas.microsoft.com/office/drawing/2010/main"/>
+              </a:ext>
+            </a:extLst>
+          </a:blip>
+          <a:stretch>
+            <a:fillRect/>
+          </a:stretch>
+        </p:blipFill>
+        <p:spPr>
+          <a:xfrm>
+            <a:off x="9324189" y="2539419"/>
+            <a:ext cx="2691817" cy="525232"/>
+          </a:xfrm>
+          <a:prstGeom prst="rect">
+            <a:avLst/>
+          </a:prstGeom>
+        </p:spPr>
+      </p:pic>
+      <p:pic>
+        <p:nvPicPr>
+          <p:cNvPr id="42" name="그림 18">
+            <a:extLst>
+              <a:ext uri="{FF2B5EF4-FFF2-40B4-BE49-F238E27FC236}">
+                <a16:creationId xmlns:a16="http://schemas.microsoft.com/office/drawing/2014/main" id="{59FB8D67-6A5E-366D-99AD-05C59ABB0C69}"/>
+              </a:ext>
+            </a:extLst>
+          </p:cNvPr>
+          <p:cNvPicPr>
+            <a:picLocks noChangeAspect="1"/>
+          </p:cNvPicPr>
+          <p:nvPr/>
+        </p:nvPicPr>
+        <p:blipFill>
+          <a:blip r:embed="rId22" cstate="email">
+            <a:extLst>
+              <a:ext uri="{28A0092B-C50C-407E-A947-70E740481C1C}">
+                <a14:useLocalDpi xmlns:a14="http://schemas.microsoft.com/office/drawing/2010/main"/>
+              </a:ext>
+            </a:extLst>
+          </a:blip>
+          <a:stretch>
+            <a:fillRect/>
+          </a:stretch>
+        </p:blipFill>
+        <p:spPr>
+          <a:xfrm>
+            <a:off x="3735800" y="3552211"/>
+            <a:ext cx="1572429" cy="1236571"/>
+          </a:xfrm>
+          <a:prstGeom prst="rect">
+            <a:avLst/>
+          </a:prstGeom>
+        </p:spPr>
+      </p:pic>
+      <p:pic>
+        <p:nvPicPr>
+          <p:cNvPr id="43" name="Picture 8" descr="SKT CI">
+            <a:extLst>
+              <a:ext uri="{FF2B5EF4-FFF2-40B4-BE49-F238E27FC236}">
+                <a16:creationId xmlns:a16="http://schemas.microsoft.com/office/drawing/2014/main" id="{584C37AC-09A8-115C-9E93-2F103EDD10CA}"/>
               </a:ext>
             </a:extLst>
           </p:cNvPr>
@@ -5047,10 +4575,10 @@
           <p:nvPr/>
         </p:nvPicPr>
         <p:blipFill>
-          <a:blip r:embed="rId16">
+          <a:blip r:embed="rId23" cstate="email">
             <a:extLst>
               <a:ext uri="{28A0092B-C50C-407E-A947-70E740481C1C}">
-                <a14:useLocalDpi xmlns:a14="http://schemas.microsoft.com/office/drawing/2010/main" val="0"/>
+                <a14:useLocalDpi xmlns:a14="http://schemas.microsoft.com/office/drawing/2010/main"/>
               </a:ext>
             </a:extLst>
           </a:blip>
@@ -5061,8 +4589,8 @@
         </p:blipFill>
         <p:spPr bwMode="auto">
           <a:xfrm>
-            <a:off x="3661651" y="4169599"/>
-            <a:ext cx="1834478" cy="1235859"/>
+            <a:off x="6441109" y="3683240"/>
+            <a:ext cx="2535251" cy="974511"/>
           </a:xfrm>
           <a:prstGeom prst="rect">
             <a:avLst/>
@@ -5081,10 +4609,10 @@
       </p:pic>
       <p:pic>
         <p:nvPicPr>
-          <p:cNvPr id="36" name="그림 18">
-            <a:extLst>
-              <a:ext uri="{FF2B5EF4-FFF2-40B4-BE49-F238E27FC236}">
-                <a16:creationId xmlns:a16="http://schemas.microsoft.com/office/drawing/2014/main" id="{ADEF09C9-CE62-2A48-829C-8FA613F9EC60}"/>
+          <p:cNvPr id="44" name="그림 43">
+            <a:extLst>
+              <a:ext uri="{FF2B5EF4-FFF2-40B4-BE49-F238E27FC236}">
+                <a16:creationId xmlns:a16="http://schemas.microsoft.com/office/drawing/2014/main" id="{661BDE38-DE21-A987-F68F-67F1D5C7F44A}"/>
               </a:ext>
             </a:extLst>
           </p:cNvPr>
@@ -5094,15 +4622,21 @@
           <p:nvPr/>
         </p:nvPicPr>
         <p:blipFill>
-          <a:blip r:embed="rId17"/>
+          <a:blip r:embed="rId24" cstate="email">
+            <a:extLst>
+              <a:ext uri="{28A0092B-C50C-407E-A947-70E740481C1C}">
+                <a14:useLocalDpi xmlns:a14="http://schemas.microsoft.com/office/drawing/2010/main"/>
+              </a:ext>
+            </a:extLst>
+          </a:blip>
           <a:stretch>
             <a:fillRect/>
           </a:stretch>
         </p:blipFill>
         <p:spPr>
           <a:xfrm>
-            <a:off x="9864728" y="4169599"/>
-            <a:ext cx="1572429" cy="1236571"/>
+            <a:off x="3161059" y="2545525"/>
+            <a:ext cx="2887800" cy="531090"/>
           </a:xfrm>
           <a:prstGeom prst="rect">
             <a:avLst/>
@@ -5111,55 +4645,44 @@
       </p:pic>
       <p:pic>
         <p:nvPicPr>
-          <p:cNvPr id="37" name="Picture 8" descr="SKT CI">
-            <a:extLst>
-              <a:ext uri="{FF2B5EF4-FFF2-40B4-BE49-F238E27FC236}">
-                <a16:creationId xmlns:a16="http://schemas.microsoft.com/office/drawing/2014/main" id="{A6C70536-FAD6-E847-98E1-FAD0497B0ED7}"/>
+          <p:cNvPr id="45" name="그림 44">
+            <a:extLst>
+              <a:ext uri="{FF2B5EF4-FFF2-40B4-BE49-F238E27FC236}">
+                <a16:creationId xmlns:a16="http://schemas.microsoft.com/office/drawing/2014/main" id="{F54AEF18-52C0-611D-88AB-0FAA795735D5}"/>
               </a:ext>
             </a:extLst>
           </p:cNvPr>
           <p:cNvPicPr>
-            <a:picLocks noChangeAspect="1" noChangeArrowheads="1"/>
+            <a:picLocks noChangeAspect="1"/>
           </p:cNvPicPr>
           <p:nvPr/>
         </p:nvPicPr>
         <p:blipFill>
-          <a:blip r:embed="rId18">
+          <a:blip r:embed="rId25" cstate="email">
             <a:extLst>
               <a:ext uri="{28A0092B-C50C-407E-A947-70E740481C1C}">
-                <a14:useLocalDpi xmlns:a14="http://schemas.microsoft.com/office/drawing/2010/main" val="0"/>
+                <a14:useLocalDpi xmlns:a14="http://schemas.microsoft.com/office/drawing/2010/main"/>
               </a:ext>
             </a:extLst>
           </a:blip>
-          <a:srcRect/>
           <a:stretch>
             <a:fillRect/>
           </a:stretch>
         </p:blipFill>
-        <p:spPr bwMode="auto">
-          <a:xfrm>
-            <a:off x="4795101" y="5614382"/>
-            <a:ext cx="2691817" cy="1034693"/>
+        <p:spPr>
+          <a:xfrm>
+            <a:off x="9070338" y="3728751"/>
+            <a:ext cx="3098429" cy="883487"/>
           </a:xfrm>
           <a:prstGeom prst="rect">
             <a:avLst/>
           </a:prstGeom>
-          <a:noFill/>
-          <a:extLst>
-            <a:ext uri="{909E8E84-426E-40DD-AFC4-6F175D3DCCD1}">
-              <a14:hiddenFill xmlns:a14="http://schemas.microsoft.com/office/drawing/2010/main">
-                <a:solidFill>
-                  <a:srgbClr val="FFFFFF"/>
-                </a:solidFill>
-              </a14:hiddenFill>
-            </a:ext>
-          </a:extLst>
         </p:spPr>
       </p:pic>
     </p:spTree>
     <p:extLst>
       <p:ext uri="{BB962C8B-B14F-4D97-AF65-F5344CB8AC3E}">
-        <p14:creationId xmlns:p14="http://schemas.microsoft.com/office/powerpoint/2010/main" val="1716372725"/>
+        <p14:creationId xmlns:p14="http://schemas.microsoft.com/office/powerpoint/2010/main" val="187974668"/>
       </p:ext>
     </p:extLst>
   </p:cSld>
@@ -5169,7 +4692,7 @@
 </p:sld>
 </file>
 
-<file path=ppt/slides/slide3.xml><?xml version="1.0" encoding="utf-8"?>
+<file path=ppt/slides/slide2.xml><?xml version="1.0" encoding="utf-8"?>
 <p:sld xmlns:a="http://schemas.openxmlformats.org/drawingml/2006/main" xmlns:r="http://schemas.openxmlformats.org/officeDocument/2006/relationships" xmlns:p="http://schemas.openxmlformats.org/presentationml/2006/main">
   <p:cSld>
     <p:spTree>
@@ -5198,11 +4721,17 @@
           <p:cNvGraphicFramePr>
             <a:graphicFrameLocks noGrp="1"/>
           </p:cNvGraphicFramePr>
-          <p:nvPr/>
+          <p:nvPr>
+            <p:extLst>
+              <p:ext uri="{D42A27DB-BD31-4B8C-83A1-F6EECF244321}">
+                <p14:modId xmlns:p14="http://schemas.microsoft.com/office/powerpoint/2010/main" val="1980502453"/>
+              </p:ext>
+            </p:extLst>
+          </p:nvPr>
         </p:nvGraphicFramePr>
         <p:xfrm>
-          <a:off x="0" y="0"/>
-          <a:ext cx="12192000" cy="6858000"/>
+          <a:off x="0" y="-3357154"/>
+          <a:ext cx="12192000" cy="10972800"/>
         </p:xfrm>
         <a:graphic>
           <a:graphicData uri="http://schemas.openxmlformats.org/drawingml/2006/table">
@@ -5249,7 +4778,11 @@
                       <a:endParaRPr lang="en-KR"/>
                     </a:p>
                   </a:txBody>
-                  <a:tcPr/>
+                  <a:tcPr>
+                    <a:solidFill>
+                      <a:schemeClr val="bg1"/>
+                    </a:solidFill>
+                  </a:tcPr>
                 </a:tc>
                 <a:tc>
                   <a:txBody>
@@ -5259,7 +4792,11 @@
                       <a:endParaRPr lang="en-KR" dirty="0"/>
                     </a:p>
                   </a:txBody>
-                  <a:tcPr/>
+                  <a:tcPr>
+                    <a:solidFill>
+                      <a:schemeClr val="bg1"/>
+                    </a:solidFill>
+                  </a:tcPr>
                 </a:tc>
                 <a:tc>
                   <a:txBody>
@@ -5269,7 +4806,11 @@
                       <a:endParaRPr lang="en-KR"/>
                     </a:p>
                   </a:txBody>
-                  <a:tcPr/>
+                  <a:tcPr>
+                    <a:solidFill>
+                      <a:schemeClr val="bg1"/>
+                    </a:solidFill>
+                  </a:tcPr>
                 </a:tc>
                 <a:tc>
                   <a:txBody>
@@ -5279,7 +4820,11 @@
                       <a:endParaRPr lang="en-KR"/>
                     </a:p>
                   </a:txBody>
-                  <a:tcPr/>
+                  <a:tcPr>
+                    <a:solidFill>
+                      <a:schemeClr val="bg1"/>
+                    </a:solidFill>
+                  </a:tcPr>
                 </a:tc>
                 <a:extLst>
                   <a:ext uri="{0D108BD9-81ED-4DB2-BD59-A6C34878D82A}">
@@ -5296,7 +4841,11 @@
                       <a:endParaRPr lang="en-KR"/>
                     </a:p>
                   </a:txBody>
-                  <a:tcPr/>
+                  <a:tcPr>
+                    <a:solidFill>
+                      <a:schemeClr val="bg1"/>
+                    </a:solidFill>
+                  </a:tcPr>
                 </a:tc>
                 <a:tc>
                   <a:txBody>
@@ -5306,7 +4855,11 @@
                       <a:endParaRPr lang="en-KR"/>
                     </a:p>
                   </a:txBody>
-                  <a:tcPr/>
+                  <a:tcPr>
+                    <a:solidFill>
+                      <a:schemeClr val="bg1"/>
+                    </a:solidFill>
+                  </a:tcPr>
                 </a:tc>
                 <a:tc>
                   <a:txBody>
@@ -5316,7 +4869,11 @@
                       <a:endParaRPr lang="en-KR"/>
                     </a:p>
                   </a:txBody>
-                  <a:tcPr/>
+                  <a:tcPr>
+                    <a:solidFill>
+                      <a:schemeClr val="bg1"/>
+                    </a:solidFill>
+                  </a:tcPr>
                 </a:tc>
                 <a:tc>
                   <a:txBody>
@@ -5326,7 +4883,11 @@
                       <a:endParaRPr lang="en-KR"/>
                     </a:p>
                   </a:txBody>
-                  <a:tcPr/>
+                  <a:tcPr>
+                    <a:solidFill>
+                      <a:schemeClr val="bg1"/>
+                    </a:solidFill>
+                  </a:tcPr>
                 </a:tc>
                 <a:extLst>
                   <a:ext uri="{0D108BD9-81ED-4DB2-BD59-A6C34878D82A}">
@@ -5343,7 +4904,11 @@
                       <a:endParaRPr lang="en-KR"/>
                     </a:p>
                   </a:txBody>
-                  <a:tcPr/>
+                  <a:tcPr>
+                    <a:solidFill>
+                      <a:schemeClr val="bg1"/>
+                    </a:solidFill>
+                  </a:tcPr>
                 </a:tc>
                 <a:tc>
                   <a:txBody>
@@ -5353,7 +4918,11 @@
                       <a:endParaRPr lang="en-KR"/>
                     </a:p>
                   </a:txBody>
-                  <a:tcPr/>
+                  <a:tcPr>
+                    <a:solidFill>
+                      <a:schemeClr val="bg1"/>
+                    </a:solidFill>
+                  </a:tcPr>
                 </a:tc>
                 <a:tc>
                   <a:txBody>
@@ -5363,7 +4932,11 @@
                       <a:endParaRPr lang="en-KR"/>
                     </a:p>
                   </a:txBody>
-                  <a:tcPr/>
+                  <a:tcPr>
+                    <a:solidFill>
+                      <a:schemeClr val="bg1"/>
+                    </a:solidFill>
+                  </a:tcPr>
                 </a:tc>
                 <a:tc>
                   <a:txBody>
@@ -5373,7 +4946,11 @@
                       <a:endParaRPr lang="en-KR"/>
                     </a:p>
                   </a:txBody>
-                  <a:tcPr/>
+                  <a:tcPr>
+                    <a:solidFill>
+                      <a:schemeClr val="bg1"/>
+                    </a:solidFill>
+                  </a:tcPr>
                 </a:tc>
                 <a:extLst>
                   <a:ext uri="{0D108BD9-81ED-4DB2-BD59-A6C34878D82A}">
@@ -5390,7 +4967,11 @@
                       <a:endParaRPr lang="en-KR"/>
                     </a:p>
                   </a:txBody>
-                  <a:tcPr/>
+                  <a:tcPr>
+                    <a:solidFill>
+                      <a:schemeClr val="bg1"/>
+                    </a:solidFill>
+                  </a:tcPr>
                 </a:tc>
                 <a:tc>
                   <a:txBody>
@@ -5400,7 +4981,11 @@
                       <a:endParaRPr lang="en-KR"/>
                     </a:p>
                   </a:txBody>
-                  <a:tcPr/>
+                  <a:tcPr>
+                    <a:solidFill>
+                      <a:schemeClr val="bg1"/>
+                    </a:solidFill>
+                  </a:tcPr>
                 </a:tc>
                 <a:tc>
                   <a:txBody>
@@ -5410,7 +4995,11 @@
                       <a:endParaRPr lang="en-KR"/>
                     </a:p>
                   </a:txBody>
-                  <a:tcPr/>
+                  <a:tcPr>
+                    <a:solidFill>
+                      <a:schemeClr val="bg1"/>
+                    </a:solidFill>
+                  </a:tcPr>
                 </a:tc>
                 <a:tc>
                   <a:txBody>
@@ -5420,7 +5009,11 @@
                       <a:endParaRPr lang="en-KR"/>
                     </a:p>
                   </a:txBody>
-                  <a:tcPr/>
+                  <a:tcPr>
+                    <a:solidFill>
+                      <a:schemeClr val="bg1"/>
+                    </a:solidFill>
+                  </a:tcPr>
                 </a:tc>
                 <a:extLst>
                   <a:ext uri="{0D108BD9-81ED-4DB2-BD59-A6C34878D82A}">
@@ -5437,7 +5030,11 @@
                       <a:endParaRPr lang="en-KR"/>
                     </a:p>
                   </a:txBody>
-                  <a:tcPr/>
+                  <a:tcPr>
+                    <a:solidFill>
+                      <a:schemeClr val="bg1"/>
+                    </a:solidFill>
+                  </a:tcPr>
                 </a:tc>
                 <a:tc>
                   <a:txBody>
@@ -5447,7 +5044,11 @@
                       <a:endParaRPr lang="en-KR" dirty="0"/>
                     </a:p>
                   </a:txBody>
-                  <a:tcPr/>
+                  <a:tcPr>
+                    <a:solidFill>
+                      <a:schemeClr val="bg1"/>
+                    </a:solidFill>
+                  </a:tcPr>
                 </a:tc>
                 <a:tc>
                   <a:txBody>
@@ -5457,7 +5058,11 @@
                       <a:endParaRPr lang="en-KR" dirty="0"/>
                     </a:p>
                   </a:txBody>
-                  <a:tcPr/>
+                  <a:tcPr>
+                    <a:solidFill>
+                      <a:schemeClr val="bg1"/>
+                    </a:solidFill>
+                  </a:tcPr>
                 </a:tc>
                 <a:tc>
                   <a:txBody>
@@ -5467,11 +5072,204 @@
                       <a:endParaRPr lang="en-KR" dirty="0"/>
                     </a:p>
                   </a:txBody>
-                  <a:tcPr/>
+                  <a:tcPr>
+                    <a:solidFill>
+                      <a:schemeClr val="bg1"/>
+                    </a:solidFill>
+                  </a:tcPr>
                 </a:tc>
                 <a:extLst>
                   <a:ext uri="{0D108BD9-81ED-4DB2-BD59-A6C34878D82A}">
                     <a16:rowId xmlns:a16="http://schemas.microsoft.com/office/drawing/2014/main" val="3318294382"/>
+                  </a:ext>
+                </a:extLst>
+              </a:tr>
+              <a:tr h="1371600">
+                <a:tc>
+                  <a:txBody>
+                    <a:bodyPr/>
+                    <a:lstStyle/>
+                    <a:p>
+                      <a:endParaRPr lang="en-KR"/>
+                    </a:p>
+                  </a:txBody>
+                  <a:tcPr>
+                    <a:solidFill>
+                      <a:schemeClr val="bg1"/>
+                    </a:solidFill>
+                  </a:tcPr>
+                </a:tc>
+                <a:tc>
+                  <a:txBody>
+                    <a:bodyPr/>
+                    <a:lstStyle/>
+                    <a:p>
+                      <a:endParaRPr lang="en-KR" dirty="0"/>
+                    </a:p>
+                  </a:txBody>
+                  <a:tcPr>
+                    <a:solidFill>
+                      <a:schemeClr val="bg1"/>
+                    </a:solidFill>
+                  </a:tcPr>
+                </a:tc>
+                <a:tc>
+                  <a:txBody>
+                    <a:bodyPr/>
+                    <a:lstStyle/>
+                    <a:p>
+                      <a:endParaRPr lang="en-KR" dirty="0"/>
+                    </a:p>
+                  </a:txBody>
+                  <a:tcPr>
+                    <a:solidFill>
+                      <a:schemeClr val="bg1"/>
+                    </a:solidFill>
+                  </a:tcPr>
+                </a:tc>
+                <a:tc>
+                  <a:txBody>
+                    <a:bodyPr/>
+                    <a:lstStyle/>
+                    <a:p>
+                      <a:endParaRPr lang="en-KR" dirty="0"/>
+                    </a:p>
+                  </a:txBody>
+                  <a:tcPr>
+                    <a:solidFill>
+                      <a:schemeClr val="bg1"/>
+                    </a:solidFill>
+                  </a:tcPr>
+                </a:tc>
+                <a:extLst>
+                  <a:ext uri="{0D108BD9-81ED-4DB2-BD59-A6C34878D82A}">
+                    <a16:rowId xmlns:a16="http://schemas.microsoft.com/office/drawing/2014/main" val="3494283209"/>
+                  </a:ext>
+                </a:extLst>
+              </a:tr>
+              <a:tr h="1371600">
+                <a:tc>
+                  <a:txBody>
+                    <a:bodyPr/>
+                    <a:lstStyle/>
+                    <a:p>
+                      <a:endParaRPr lang="en-KR"/>
+                    </a:p>
+                  </a:txBody>
+                  <a:tcPr>
+                    <a:solidFill>
+                      <a:schemeClr val="bg1"/>
+                    </a:solidFill>
+                  </a:tcPr>
+                </a:tc>
+                <a:tc>
+                  <a:txBody>
+                    <a:bodyPr/>
+                    <a:lstStyle/>
+                    <a:p>
+                      <a:endParaRPr lang="en-KR" dirty="0"/>
+                    </a:p>
+                  </a:txBody>
+                  <a:tcPr>
+                    <a:solidFill>
+                      <a:schemeClr val="bg1"/>
+                    </a:solidFill>
+                  </a:tcPr>
+                </a:tc>
+                <a:tc>
+                  <a:txBody>
+                    <a:bodyPr/>
+                    <a:lstStyle/>
+                    <a:p>
+                      <a:endParaRPr lang="en-KR" dirty="0"/>
+                    </a:p>
+                  </a:txBody>
+                  <a:tcPr>
+                    <a:solidFill>
+                      <a:schemeClr val="bg1"/>
+                    </a:solidFill>
+                  </a:tcPr>
+                </a:tc>
+                <a:tc>
+                  <a:txBody>
+                    <a:bodyPr/>
+                    <a:lstStyle/>
+                    <a:p>
+                      <a:endParaRPr lang="en-KR" dirty="0"/>
+                    </a:p>
+                  </a:txBody>
+                  <a:tcPr>
+                    <a:solidFill>
+                      <a:schemeClr val="bg1"/>
+                    </a:solidFill>
+                  </a:tcPr>
+                </a:tc>
+                <a:extLst>
+                  <a:ext uri="{0D108BD9-81ED-4DB2-BD59-A6C34878D82A}">
+                    <a16:rowId xmlns:a16="http://schemas.microsoft.com/office/drawing/2014/main" val="2953121858"/>
+                  </a:ext>
+                </a:extLst>
+              </a:tr>
+              <a:tr h="1371600">
+                <a:tc>
+                  <a:txBody>
+                    <a:bodyPr/>
+                    <a:lstStyle/>
+                    <a:p>
+                      <a:endParaRPr lang="en-KR"/>
+                    </a:p>
+                  </a:txBody>
+                  <a:tcPr>
+                    <a:solidFill>
+                      <a:schemeClr val="bg1"/>
+                    </a:solidFill>
+                  </a:tcPr>
+                </a:tc>
+                <a:tc>
+                  <a:txBody>
+                    <a:bodyPr/>
+                    <a:lstStyle/>
+                    <a:p>
+                      <a:endParaRPr lang="en-KR" dirty="0"/>
+                    </a:p>
+                  </a:txBody>
+                  <a:tcPr>
+                    <a:solidFill>
+                      <a:schemeClr val="bg1"/>
+                    </a:solidFill>
+                  </a:tcPr>
+                </a:tc>
+                <a:tc>
+                  <a:txBody>
+                    <a:bodyPr/>
+                    <a:lstStyle/>
+                    <a:p>
+                      <a:endParaRPr lang="en-KR" dirty="0"/>
+                    </a:p>
+                  </a:txBody>
+                  <a:tcPr>
+                    <a:solidFill>
+                      <a:schemeClr val="bg1"/>
+                    </a:solidFill>
+                  </a:tcPr>
+                </a:tc>
+                <a:tc>
+                  <a:txBody>
+                    <a:bodyPr/>
+                    <a:lstStyle/>
+                    <a:p>
+                      <a:endParaRPr lang="en-KR" dirty="0"/>
+                    </a:p>
+                  </a:txBody>
+                  <a:tcPr>
+                    <a:solidFill>
+                      <a:schemeClr val="bg1"/>
+                    </a:solidFill>
+                  </a:tcPr>
+                </a:tc>
+                <a:extLst>
+                  <a:ext uri="{0D108BD9-81ED-4DB2-BD59-A6C34878D82A}">
+                    <a16:rowId xmlns:a16="http://schemas.microsoft.com/office/drawing/2014/main" val="1285290908"/>
                   </a:ext>
                 </a:extLst>
               </a:tr>
@@ -5481,10 +5279,10 @@
       </p:graphicFrame>
       <p:pic>
         <p:nvPicPr>
-          <p:cNvPr id="20" name="Picture 19">
-            <a:extLst>
-              <a:ext uri="{FF2B5EF4-FFF2-40B4-BE49-F238E27FC236}">
-                <a16:creationId xmlns:a16="http://schemas.microsoft.com/office/drawing/2014/main" id="{C8D8A3BB-A315-4843-9192-8B7C90007206}"/>
+          <p:cNvPr id="8" name="그림 7">
+            <a:extLst>
+              <a:ext uri="{FF2B5EF4-FFF2-40B4-BE49-F238E27FC236}">
+                <a16:creationId xmlns:a16="http://schemas.microsoft.com/office/drawing/2014/main" id="{C65AB2E4-F8CB-C301-F2DB-F6E042D0F5E8}"/>
               </a:ext>
             </a:extLst>
           </p:cNvPr>
@@ -5494,15 +5292,21 @@
           <p:nvPr/>
         </p:nvPicPr>
         <p:blipFill>
-          <a:blip r:embed="rId2"/>
+          <a:blip r:embed="rId2" cstate="email">
+            <a:extLst>
+              <a:ext uri="{28A0092B-C50C-407E-A947-70E740481C1C}">
+                <a14:useLocalDpi xmlns:a14="http://schemas.microsoft.com/office/drawing/2010/main"/>
+              </a:ext>
+            </a:extLst>
+          </a:blip>
           <a:stretch>
             <a:fillRect/>
           </a:stretch>
         </p:blipFill>
         <p:spPr>
           <a:xfrm>
-            <a:off x="3409619" y="211577"/>
-            <a:ext cx="2438400" cy="914400"/>
+            <a:off x="6522900" y="-3119551"/>
+            <a:ext cx="2547438" cy="897994"/>
           </a:xfrm>
           <a:prstGeom prst="rect">
             <a:avLst/>
@@ -5511,10 +5315,10 @@
       </p:pic>
       <p:pic>
         <p:nvPicPr>
-          <p:cNvPr id="21" name="그림 16">
-            <a:extLst>
-              <a:ext uri="{FF2B5EF4-FFF2-40B4-BE49-F238E27FC236}">
-                <a16:creationId xmlns:a16="http://schemas.microsoft.com/office/drawing/2014/main" id="{0C70F9D8-AECB-B643-AC53-6BDEFD9660D9}"/>
+          <p:cNvPr id="9" name="그림 8">
+            <a:extLst>
+              <a:ext uri="{FF2B5EF4-FFF2-40B4-BE49-F238E27FC236}">
+                <a16:creationId xmlns:a16="http://schemas.microsoft.com/office/drawing/2014/main" id="{087B06A0-DDA4-70EA-2D86-F9CDABF38C1A}"/>
               </a:ext>
             </a:extLst>
           </p:cNvPr>
@@ -5524,15 +5328,21 @@
           <p:nvPr/>
         </p:nvPicPr>
         <p:blipFill>
-          <a:blip r:embed="rId3"/>
+          <a:blip r:embed="rId3" cstate="email">
+            <a:extLst>
+              <a:ext uri="{28A0092B-C50C-407E-A947-70E740481C1C}">
+                <a14:useLocalDpi xmlns:a14="http://schemas.microsoft.com/office/drawing/2010/main"/>
+              </a:ext>
+            </a:extLst>
+          </a:blip>
           <a:stretch>
             <a:fillRect/>
           </a:stretch>
         </p:blipFill>
         <p:spPr>
           <a:xfrm>
-            <a:off x="6152819" y="429781"/>
-            <a:ext cx="2880360" cy="477991"/>
+            <a:off x="107574" y="-3107142"/>
+            <a:ext cx="2541114" cy="741613"/>
           </a:xfrm>
           <a:prstGeom prst="rect">
             <a:avLst/>
@@ -5541,10 +5351,10 @@
       </p:pic>
       <p:pic>
         <p:nvPicPr>
-          <p:cNvPr id="22" name="Picture 21">
-            <a:extLst>
-              <a:ext uri="{FF2B5EF4-FFF2-40B4-BE49-F238E27FC236}">
-                <a16:creationId xmlns:a16="http://schemas.microsoft.com/office/drawing/2014/main" id="{D8B7F372-9939-1C44-BDB1-E2B0E94BAA1D}"/>
+          <p:cNvPr id="10" name="그림 9">
+            <a:extLst>
+              <a:ext uri="{FF2B5EF4-FFF2-40B4-BE49-F238E27FC236}">
+                <a16:creationId xmlns:a16="http://schemas.microsoft.com/office/drawing/2014/main" id="{DFF2FA41-2471-EA04-07A3-049B0E154811}"/>
               </a:ext>
             </a:extLst>
           </p:cNvPr>
@@ -5554,15 +5364,21 @@
           <p:nvPr/>
         </p:nvPicPr>
         <p:blipFill>
-          <a:blip r:embed="rId4"/>
+          <a:blip r:embed="rId4" cstate="email">
+            <a:extLst>
+              <a:ext uri="{28A0092B-C50C-407E-A947-70E740481C1C}">
+                <a14:useLocalDpi xmlns:a14="http://schemas.microsoft.com/office/drawing/2010/main"/>
+              </a:ext>
+            </a:extLst>
+          </a:blip>
           <a:stretch>
             <a:fillRect/>
           </a:stretch>
         </p:blipFill>
         <p:spPr>
           <a:xfrm>
-            <a:off x="9289719" y="264916"/>
-            <a:ext cx="2692400" cy="807720"/>
+            <a:off x="2756262" y="-2975578"/>
+            <a:ext cx="3531507" cy="610049"/>
           </a:xfrm>
           <a:prstGeom prst="rect">
             <a:avLst/>
@@ -5571,10 +5387,10 @@
       </p:pic>
       <p:pic>
         <p:nvPicPr>
-          <p:cNvPr id="23" name="Picture 22">
-            <a:extLst>
-              <a:ext uri="{FF2B5EF4-FFF2-40B4-BE49-F238E27FC236}">
-                <a16:creationId xmlns:a16="http://schemas.microsoft.com/office/drawing/2014/main" id="{B2A7E2CC-965A-4C48-AE11-696AD5BE9557}"/>
+          <p:cNvPr id="11" name="Picture 28">
+            <a:extLst>
+              <a:ext uri="{FF2B5EF4-FFF2-40B4-BE49-F238E27FC236}">
+                <a16:creationId xmlns:a16="http://schemas.microsoft.com/office/drawing/2014/main" id="{EAA4288E-7BBA-9D37-74C5-E7D01265AC4C}"/>
               </a:ext>
             </a:extLst>
           </p:cNvPr>
@@ -5584,15 +5400,21 @@
           <p:nvPr/>
         </p:nvPicPr>
         <p:blipFill>
-          <a:blip r:embed="rId5"/>
+          <a:blip r:embed="rId5" cstate="email">
+            <a:extLst>
+              <a:ext uri="{28A0092B-C50C-407E-A947-70E740481C1C}">
+                <a14:useLocalDpi xmlns:a14="http://schemas.microsoft.com/office/drawing/2010/main"/>
+              </a:ext>
+            </a:extLst>
+          </a:blip>
           <a:stretch>
             <a:fillRect/>
           </a:stretch>
         </p:blipFill>
         <p:spPr>
           <a:xfrm>
-            <a:off x="242497" y="1599132"/>
-            <a:ext cx="2667000" cy="941647"/>
+            <a:off x="9814930" y="-3373898"/>
+            <a:ext cx="1710337" cy="1406691"/>
           </a:xfrm>
           <a:prstGeom prst="rect">
             <a:avLst/>
@@ -5601,10 +5423,10 @@
       </p:pic>
       <p:pic>
         <p:nvPicPr>
-          <p:cNvPr id="24" name="그림 5">
-            <a:extLst>
-              <a:ext uri="{FF2B5EF4-FFF2-40B4-BE49-F238E27FC236}">
-                <a16:creationId xmlns:a16="http://schemas.microsoft.com/office/drawing/2014/main" id="{99A22A7B-2B39-F444-87CF-D942FA5EFAAA}"/>
+          <p:cNvPr id="12" name="Picture 19">
+            <a:extLst>
+              <a:ext uri="{FF2B5EF4-FFF2-40B4-BE49-F238E27FC236}">
+                <a16:creationId xmlns:a16="http://schemas.microsoft.com/office/drawing/2014/main" id="{B9B914B5-3A95-CB46-A724-6FC75F85C45A}"/>
               </a:ext>
             </a:extLst>
           </p:cNvPr>
@@ -5614,15 +5436,21 @@
           <p:nvPr/>
         </p:nvPicPr>
         <p:blipFill>
-          <a:blip r:embed="rId6"/>
+          <a:blip r:embed="rId6" cstate="email">
+            <a:extLst>
+              <a:ext uri="{28A0092B-C50C-407E-A947-70E740481C1C}">
+                <a14:useLocalDpi xmlns:a14="http://schemas.microsoft.com/office/drawing/2010/main"/>
+              </a:ext>
+            </a:extLst>
+          </a:blip>
           <a:stretch>
             <a:fillRect/>
           </a:stretch>
         </p:blipFill>
         <p:spPr>
           <a:xfrm>
-            <a:off x="3409619" y="1578551"/>
-            <a:ext cx="2387373" cy="1016844"/>
+            <a:off x="3352800" y="-1803835"/>
+            <a:ext cx="2438400" cy="914400"/>
           </a:xfrm>
           <a:prstGeom prst="rect">
             <a:avLst/>
@@ -5631,10 +5459,10 @@
       </p:pic>
       <p:pic>
         <p:nvPicPr>
-          <p:cNvPr id="26" name="Picture 25">
-            <a:extLst>
-              <a:ext uri="{FF2B5EF4-FFF2-40B4-BE49-F238E27FC236}">
-                <a16:creationId xmlns:a16="http://schemas.microsoft.com/office/drawing/2014/main" id="{2CE40AB1-6456-204B-8528-90EF22A94915}"/>
+          <p:cNvPr id="13" name="그림 16">
+            <a:extLst>
+              <a:ext uri="{FF2B5EF4-FFF2-40B4-BE49-F238E27FC236}">
+                <a16:creationId xmlns:a16="http://schemas.microsoft.com/office/drawing/2014/main" id="{689C22E3-9FC9-6AF8-6317-59ACC44AD87A}"/>
               </a:ext>
             </a:extLst>
           </p:cNvPr>
@@ -5644,15 +5472,21 @@
           <p:nvPr/>
         </p:nvPicPr>
         <p:blipFill>
-          <a:blip r:embed="rId7"/>
+          <a:blip r:embed="rId7" cstate="email">
+            <a:extLst>
+              <a:ext uri="{28A0092B-C50C-407E-A947-70E740481C1C}">
+                <a14:useLocalDpi xmlns:a14="http://schemas.microsoft.com/office/drawing/2010/main"/>
+              </a:ext>
+            </a:extLst>
+          </a:blip>
           <a:stretch>
             <a:fillRect/>
           </a:stretch>
         </p:blipFill>
         <p:spPr>
           <a:xfrm>
-            <a:off x="6223271" y="1736740"/>
-            <a:ext cx="2880360" cy="700465"/>
+            <a:off x="6096000" y="-1585631"/>
+            <a:ext cx="2880360" cy="477991"/>
           </a:xfrm>
           <a:prstGeom prst="rect">
             <a:avLst/>
@@ -5661,10 +5495,184 @@
       </p:pic>
       <p:pic>
         <p:nvPicPr>
-          <p:cNvPr id="27" name="Picture 10" descr="Koh Young Technology - 2020년 전문연구요원 모집">
-            <a:extLst>
-              <a:ext uri="{FF2B5EF4-FFF2-40B4-BE49-F238E27FC236}">
-                <a16:creationId xmlns:a16="http://schemas.microsoft.com/office/drawing/2014/main" id="{1D36A79E-B117-4D43-95C5-22B27EE8E89C}"/>
+          <p:cNvPr id="14" name="Picture 21">
+            <a:extLst>
+              <a:ext uri="{FF2B5EF4-FFF2-40B4-BE49-F238E27FC236}">
+                <a16:creationId xmlns:a16="http://schemas.microsoft.com/office/drawing/2014/main" id="{186BEFEA-6707-443B-8933-D4B2F2E14019}"/>
+              </a:ext>
+            </a:extLst>
+          </p:cNvPr>
+          <p:cNvPicPr>
+            <a:picLocks noChangeAspect="1"/>
+          </p:cNvPicPr>
+          <p:nvPr/>
+        </p:nvPicPr>
+        <p:blipFill>
+          <a:blip r:embed="rId8" cstate="email">
+            <a:extLst>
+              <a:ext uri="{28A0092B-C50C-407E-A947-70E740481C1C}">
+                <a14:useLocalDpi xmlns:a14="http://schemas.microsoft.com/office/drawing/2010/main"/>
+              </a:ext>
+            </a:extLst>
+          </a:blip>
+          <a:stretch>
+            <a:fillRect/>
+          </a:stretch>
+        </p:blipFill>
+        <p:spPr>
+          <a:xfrm>
+            <a:off x="9232900" y="-1750496"/>
+            <a:ext cx="2692400" cy="807720"/>
+          </a:xfrm>
+          <a:prstGeom prst="rect">
+            <a:avLst/>
+          </a:prstGeom>
+        </p:spPr>
+      </p:pic>
+      <p:pic>
+        <p:nvPicPr>
+          <p:cNvPr id="15" name="Picture 4">
+            <a:extLst>
+              <a:ext uri="{FF2B5EF4-FFF2-40B4-BE49-F238E27FC236}">
+                <a16:creationId xmlns:a16="http://schemas.microsoft.com/office/drawing/2014/main" id="{F33D6315-1718-5C4F-DECF-93D4F64860E2}"/>
+              </a:ext>
+            </a:extLst>
+          </p:cNvPr>
+          <p:cNvPicPr>
+            <a:picLocks noChangeAspect="1"/>
+          </p:cNvPicPr>
+          <p:nvPr/>
+        </p:nvPicPr>
+        <p:blipFill>
+          <a:blip r:embed="rId9" cstate="email">
+            <a:extLst>
+              <a:ext uri="{28A0092B-C50C-407E-A947-70E740481C1C}">
+                <a14:useLocalDpi xmlns:a14="http://schemas.microsoft.com/office/drawing/2010/main"/>
+              </a:ext>
+            </a:extLst>
+          </a:blip>
+          <a:stretch>
+            <a:fillRect/>
+          </a:stretch>
+        </p:blipFill>
+        <p:spPr>
+          <a:xfrm>
+            <a:off x="810723" y="-1949406"/>
+            <a:ext cx="1416909" cy="1247092"/>
+          </a:xfrm>
+          <a:prstGeom prst="rect">
+            <a:avLst/>
+          </a:prstGeom>
+        </p:spPr>
+      </p:pic>
+      <p:pic>
+        <p:nvPicPr>
+          <p:cNvPr id="16" name="Picture 22">
+            <a:extLst>
+              <a:ext uri="{FF2B5EF4-FFF2-40B4-BE49-F238E27FC236}">
+                <a16:creationId xmlns:a16="http://schemas.microsoft.com/office/drawing/2014/main" id="{59D5F6C6-2D64-ED92-71F3-75AEA8C90536}"/>
+              </a:ext>
+            </a:extLst>
+          </p:cNvPr>
+          <p:cNvPicPr>
+            <a:picLocks noChangeAspect="1"/>
+          </p:cNvPicPr>
+          <p:nvPr/>
+        </p:nvPicPr>
+        <p:blipFill>
+          <a:blip r:embed="rId10" cstate="email">
+            <a:extLst>
+              <a:ext uri="{28A0092B-C50C-407E-A947-70E740481C1C}">
+                <a14:useLocalDpi xmlns:a14="http://schemas.microsoft.com/office/drawing/2010/main"/>
+              </a:ext>
+            </a:extLst>
+          </a:blip>
+          <a:stretch>
+            <a:fillRect/>
+          </a:stretch>
+        </p:blipFill>
+        <p:spPr>
+          <a:xfrm>
+            <a:off x="306995" y="-423799"/>
+            <a:ext cx="2667000" cy="941647"/>
+          </a:xfrm>
+          <a:prstGeom prst="rect">
+            <a:avLst/>
+          </a:prstGeom>
+        </p:spPr>
+      </p:pic>
+      <p:pic>
+        <p:nvPicPr>
+          <p:cNvPr id="17" name="그림 5">
+            <a:extLst>
+              <a:ext uri="{FF2B5EF4-FFF2-40B4-BE49-F238E27FC236}">
+                <a16:creationId xmlns:a16="http://schemas.microsoft.com/office/drawing/2014/main" id="{1E13A434-1D4D-38B3-0F43-007E18E41517}"/>
+              </a:ext>
+            </a:extLst>
+          </p:cNvPr>
+          <p:cNvPicPr>
+            <a:picLocks noChangeAspect="1"/>
+          </p:cNvPicPr>
+          <p:nvPr/>
+        </p:nvPicPr>
+        <p:blipFill>
+          <a:blip r:embed="rId11"/>
+          <a:stretch>
+            <a:fillRect/>
+          </a:stretch>
+        </p:blipFill>
+        <p:spPr>
+          <a:xfrm>
+            <a:off x="3474117" y="-444380"/>
+            <a:ext cx="2387373" cy="1016844"/>
+          </a:xfrm>
+          <a:prstGeom prst="rect">
+            <a:avLst/>
+          </a:prstGeom>
+        </p:spPr>
+      </p:pic>
+      <p:pic>
+        <p:nvPicPr>
+          <p:cNvPr id="18" name="Picture 25">
+            <a:extLst>
+              <a:ext uri="{FF2B5EF4-FFF2-40B4-BE49-F238E27FC236}">
+                <a16:creationId xmlns:a16="http://schemas.microsoft.com/office/drawing/2014/main" id="{0E1DE2C8-FB23-E27C-CDB4-F6420DBD834A}"/>
+              </a:ext>
+            </a:extLst>
+          </p:cNvPr>
+          <p:cNvPicPr>
+            <a:picLocks noChangeAspect="1"/>
+          </p:cNvPicPr>
+          <p:nvPr/>
+        </p:nvPicPr>
+        <p:blipFill>
+          <a:blip r:embed="rId12" cstate="email">
+            <a:extLst>
+              <a:ext uri="{28A0092B-C50C-407E-A947-70E740481C1C}">
+                <a14:useLocalDpi xmlns:a14="http://schemas.microsoft.com/office/drawing/2010/main"/>
+              </a:ext>
+            </a:extLst>
+          </a:blip>
+          <a:stretch>
+            <a:fillRect/>
+          </a:stretch>
+        </p:blipFill>
+        <p:spPr>
+          <a:xfrm>
+            <a:off x="6287769" y="-286191"/>
+            <a:ext cx="2880360" cy="700465"/>
+          </a:xfrm>
+          <a:prstGeom prst="rect">
+            <a:avLst/>
+          </a:prstGeom>
+        </p:spPr>
+      </p:pic>
+      <p:pic>
+        <p:nvPicPr>
+          <p:cNvPr id="19" name="Picture 10" descr="Koh Young Technology - 2020년 전문연구요원 모집">
+            <a:extLst>
+              <a:ext uri="{FF2B5EF4-FFF2-40B4-BE49-F238E27FC236}">
+                <a16:creationId xmlns:a16="http://schemas.microsoft.com/office/drawing/2014/main" id="{918BF1C3-6774-3E1D-344E-189958483252}"/>
               </a:ext>
             </a:extLst>
           </p:cNvPr>
@@ -5674,10 +5682,10 @@
           <p:nvPr/>
         </p:nvPicPr>
         <p:blipFill>
-          <a:blip r:embed="rId8">
+          <a:blip r:embed="rId13" cstate="email">
             <a:extLst>
               <a:ext uri="{28A0092B-C50C-407E-A947-70E740481C1C}">
-                <a14:useLocalDpi xmlns:a14="http://schemas.microsoft.com/office/drawing/2010/main" val="0"/>
+                <a14:useLocalDpi xmlns:a14="http://schemas.microsoft.com/office/drawing/2010/main"/>
               </a:ext>
             </a:extLst>
           </a:blip>
@@ -5688,8 +5696,8 @@
         </p:blipFill>
         <p:spPr bwMode="auto">
           <a:xfrm>
-            <a:off x="521147" y="2772325"/>
-            <a:ext cx="2118811" cy="1260967"/>
+            <a:off x="9490379" y="-646254"/>
+            <a:ext cx="2387025" cy="1420589"/>
           </a:xfrm>
           <a:prstGeom prst="rect">
             <a:avLst/>
@@ -5708,10 +5716,10 @@
       </p:pic>
       <p:pic>
         <p:nvPicPr>
-          <p:cNvPr id="28" name="그림 7">
-            <a:extLst>
-              <a:ext uri="{FF2B5EF4-FFF2-40B4-BE49-F238E27FC236}">
-                <a16:creationId xmlns:a16="http://schemas.microsoft.com/office/drawing/2014/main" id="{3606F132-6404-0C4D-997C-E843E8DDE0C8}"/>
+          <p:cNvPr id="25" name="그림 7">
+            <a:extLst>
+              <a:ext uri="{FF2B5EF4-FFF2-40B4-BE49-F238E27FC236}">
+                <a16:creationId xmlns:a16="http://schemas.microsoft.com/office/drawing/2014/main" id="{EEFD313E-451E-68CC-66AF-7F4175449819}"/>
               </a:ext>
             </a:extLst>
           </p:cNvPr>
@@ -5721,14 +5729,20 @@
           <p:nvPr/>
         </p:nvPicPr>
         <p:blipFill>
-          <a:blip r:embed="rId9"/>
+          <a:blip r:embed="rId14" cstate="email">
+            <a:extLst>
+              <a:ext uri="{28A0092B-C50C-407E-A947-70E740481C1C}">
+                <a14:useLocalDpi xmlns:a14="http://schemas.microsoft.com/office/drawing/2010/main"/>
+              </a:ext>
+            </a:extLst>
+          </a:blip>
           <a:stretch>
             <a:fillRect/>
           </a:stretch>
         </p:blipFill>
         <p:spPr>
           <a:xfrm>
-            <a:off x="3882256" y="2940597"/>
+            <a:off x="909952" y="956191"/>
             <a:ext cx="1154717" cy="970631"/>
           </a:xfrm>
           <a:prstGeom prst="rect">
@@ -5738,10 +5752,10 @@
       </p:pic>
       <p:pic>
         <p:nvPicPr>
-          <p:cNvPr id="29" name="Picture 28">
-            <a:extLst>
-              <a:ext uri="{FF2B5EF4-FFF2-40B4-BE49-F238E27FC236}">
-                <a16:creationId xmlns:a16="http://schemas.microsoft.com/office/drawing/2014/main" id="{613EED19-8BFE-7F41-AA99-DEDEC5D69CC2}"/>
+          <p:cNvPr id="34" name="그림 11">
+            <a:extLst>
+              <a:ext uri="{FF2B5EF4-FFF2-40B4-BE49-F238E27FC236}">
+                <a16:creationId xmlns:a16="http://schemas.microsoft.com/office/drawing/2014/main" id="{B0726CA1-1E17-BD14-C6D4-4CEFEEB38D19}"/>
               </a:ext>
             </a:extLst>
           </p:cNvPr>
@@ -5751,7 +5765,7 @@
           <p:nvPr/>
         </p:nvPicPr>
         <p:blipFill>
-          <a:blip r:embed="rId10" cstate="email">
+          <a:blip r:embed="rId15" cstate="email">
             <a:extLst>
               <a:ext uri="{28A0092B-C50C-407E-A947-70E740481C1C}">
                 <a14:useLocalDpi xmlns:a14="http://schemas.microsoft.com/office/drawing/2010/main"/>
@@ -5764,8 +5778,8 @@
         </p:blipFill>
         <p:spPr>
           <a:xfrm>
-            <a:off x="9854119" y="1366611"/>
-            <a:ext cx="1710337" cy="1406691"/>
+            <a:off x="3315891" y="952564"/>
+            <a:ext cx="2421785" cy="915174"/>
           </a:xfrm>
           <a:prstGeom prst="rect">
             <a:avLst/>
@@ -5774,46 +5788,10 @@
       </p:pic>
       <p:pic>
         <p:nvPicPr>
-          <p:cNvPr id="30" name="그림 11">
-            <a:extLst>
-              <a:ext uri="{FF2B5EF4-FFF2-40B4-BE49-F238E27FC236}">
-                <a16:creationId xmlns:a16="http://schemas.microsoft.com/office/drawing/2014/main" id="{6345D305-77DB-044B-8C53-8EE3A0C2A555}"/>
-              </a:ext>
-            </a:extLst>
-          </p:cNvPr>
-          <p:cNvPicPr>
-            <a:picLocks noChangeAspect="1"/>
-          </p:cNvPicPr>
-          <p:nvPr/>
-        </p:nvPicPr>
-        <p:blipFill>
-          <a:blip r:embed="rId11">
-            <a:extLst>
-              <a:ext uri="{28A0092B-C50C-407E-A947-70E740481C1C}">
-                <a14:useLocalDpi xmlns:a14="http://schemas.microsoft.com/office/drawing/2010/main" val="0"/>
-              </a:ext>
-            </a:extLst>
-          </a:blip>
-          <a:stretch>
-            <a:fillRect/>
-          </a:stretch>
-        </p:blipFill>
-        <p:spPr>
-          <a:xfrm>
-            <a:off x="6288195" y="2936970"/>
-            <a:ext cx="2421785" cy="915174"/>
-          </a:xfrm>
-          <a:prstGeom prst="rect">
-            <a:avLst/>
-          </a:prstGeom>
-        </p:spPr>
-      </p:pic>
-      <p:pic>
-        <p:nvPicPr>
-          <p:cNvPr id="31" name="Picture 26" descr="라인플러스 기업정보 보기">
-            <a:extLst>
-              <a:ext uri="{FF2B5EF4-FFF2-40B4-BE49-F238E27FC236}">
-                <a16:creationId xmlns:a16="http://schemas.microsoft.com/office/drawing/2014/main" id="{18C65C2F-682C-974F-BD11-57A3CD7CEC2A}"/>
+          <p:cNvPr id="36" name="Picture 30" descr="LG전자 (엘지) 로고">
+            <a:extLst>
+              <a:ext uri="{FF2B5EF4-FFF2-40B4-BE49-F238E27FC236}">
+                <a16:creationId xmlns:a16="http://schemas.microsoft.com/office/drawing/2014/main" id="{A4369F3C-FF10-1B3D-99C0-6B8F03A42990}"/>
               </a:ext>
             </a:extLst>
           </p:cNvPr>
@@ -5823,10 +5801,10 @@
           <p:nvPr/>
         </p:nvPicPr>
         <p:blipFill>
-          <a:blip r:embed="rId12">
+          <a:blip r:embed="rId16" cstate="email">
             <a:extLst>
               <a:ext uri="{28A0092B-C50C-407E-A947-70E740481C1C}">
-                <a14:useLocalDpi xmlns:a14="http://schemas.microsoft.com/office/drawing/2010/main" val="0"/>
+                <a14:useLocalDpi xmlns:a14="http://schemas.microsoft.com/office/drawing/2010/main"/>
               </a:ext>
             </a:extLst>
           </a:blip>
@@ -5837,8 +5815,8 @@
         </p:blipFill>
         <p:spPr bwMode="auto">
           <a:xfrm>
-            <a:off x="444848" y="4438125"/>
-            <a:ext cx="2195110" cy="767441"/>
+            <a:off x="5876730" y="1003218"/>
+            <a:ext cx="3680750" cy="807720"/>
           </a:xfrm>
           <a:prstGeom prst="rect">
             <a:avLst/>
@@ -5857,10 +5835,10 @@
       </p:pic>
       <p:pic>
         <p:nvPicPr>
-          <p:cNvPr id="32" name="Picture 30" descr="LG전자 (엘지) 로고">
-            <a:extLst>
-              <a:ext uri="{FF2B5EF4-FFF2-40B4-BE49-F238E27FC236}">
-                <a16:creationId xmlns:a16="http://schemas.microsoft.com/office/drawing/2014/main" id="{9ECF1BB6-CF62-E045-8E30-20880B8BFA23}"/>
+          <p:cNvPr id="37" name="Picture 26" descr="라인플러스 기업정보 보기">
+            <a:extLst>
+              <a:ext uri="{FF2B5EF4-FFF2-40B4-BE49-F238E27FC236}">
+                <a16:creationId xmlns:a16="http://schemas.microsoft.com/office/drawing/2014/main" id="{279F445E-9306-A749-460C-236578D66457}"/>
               </a:ext>
             </a:extLst>
           </p:cNvPr>
@@ -5870,10 +5848,10 @@
           <p:nvPr/>
         </p:nvPicPr>
         <p:blipFill>
-          <a:blip r:embed="rId13">
+          <a:blip r:embed="rId17" cstate="email">
             <a:extLst>
               <a:ext uri="{28A0092B-C50C-407E-A947-70E740481C1C}">
-                <a14:useLocalDpi xmlns:a14="http://schemas.microsoft.com/office/drawing/2010/main" val="0"/>
+                <a14:useLocalDpi xmlns:a14="http://schemas.microsoft.com/office/drawing/2010/main"/>
               </a:ext>
             </a:extLst>
           </a:blip>
@@ -5884,8 +5862,8 @@
         </p:blipFill>
         <p:spPr bwMode="auto">
           <a:xfrm>
-            <a:off x="9013211" y="3075679"/>
-            <a:ext cx="3191993" cy="700465"/>
+            <a:off x="9586336" y="1043497"/>
+            <a:ext cx="2195110" cy="767441"/>
           </a:xfrm>
           <a:prstGeom prst="rect">
             <a:avLst/>
@@ -5904,10 +5882,10 @@
       </p:pic>
       <p:pic>
         <p:nvPicPr>
-          <p:cNvPr id="33" name="Picture 4">
-            <a:extLst>
-              <a:ext uri="{FF2B5EF4-FFF2-40B4-BE49-F238E27FC236}">
-                <a16:creationId xmlns:a16="http://schemas.microsoft.com/office/drawing/2014/main" id="{FD52486A-2809-7943-B331-D672480B10E9}"/>
+          <p:cNvPr id="38" name="Picture 4">
+            <a:extLst>
+              <a:ext uri="{FF2B5EF4-FFF2-40B4-BE49-F238E27FC236}">
+                <a16:creationId xmlns:a16="http://schemas.microsoft.com/office/drawing/2014/main" id="{5EB4D0BD-9957-9DBD-470A-C38BC06C006A}"/>
               </a:ext>
             </a:extLst>
           </p:cNvPr>
@@ -5917,7 +5895,7 @@
           <p:nvPr/>
         </p:nvPicPr>
         <p:blipFill>
-          <a:blip r:embed="rId14" cstate="email">
+          <a:blip r:embed="rId18" cstate="email">
             <a:extLst>
               <a:ext uri="{28A0092B-C50C-407E-A947-70E740481C1C}">
                 <a14:useLocalDpi xmlns:a14="http://schemas.microsoft.com/office/drawing/2010/main"/>
@@ -5931,7 +5909,7 @@
         </p:blipFill>
         <p:spPr bwMode="auto">
           <a:xfrm>
-            <a:off x="3637371" y="4343621"/>
+            <a:off x="567140" y="2361269"/>
             <a:ext cx="1904074" cy="970631"/>
           </a:xfrm>
           <a:prstGeom prst="rect">
@@ -5951,10 +5929,10 @@
       </p:pic>
       <p:pic>
         <p:nvPicPr>
-          <p:cNvPr id="35" name="Picture 28" descr="image.fnnews.com/resource/media/image/2020/01/0...">
-            <a:extLst>
-              <a:ext uri="{FF2B5EF4-FFF2-40B4-BE49-F238E27FC236}">
-                <a16:creationId xmlns:a16="http://schemas.microsoft.com/office/drawing/2014/main" id="{C1F7B736-09FE-3144-A90D-1D9F7E8AA714}"/>
+          <p:cNvPr id="39" name="Picture 28" descr="image.fnnews.com/resource/media/image/2020/01/0...">
+            <a:extLst>
+              <a:ext uri="{FF2B5EF4-FFF2-40B4-BE49-F238E27FC236}">
+                <a16:creationId xmlns:a16="http://schemas.microsoft.com/office/drawing/2014/main" id="{5DB1CD15-26FF-7CF5-C3F8-237F32CD3567}"/>
               </a:ext>
             </a:extLst>
           </p:cNvPr>
@@ -5964,10 +5942,10 @@
           <p:nvPr/>
         </p:nvPicPr>
         <p:blipFill>
-          <a:blip r:embed="rId15">
+          <a:blip r:embed="rId19" cstate="email">
             <a:extLst>
               <a:ext uri="{28A0092B-C50C-407E-A947-70E740481C1C}">
-                <a14:useLocalDpi xmlns:a14="http://schemas.microsoft.com/office/drawing/2010/main" val="0"/>
+                <a14:useLocalDpi xmlns:a14="http://schemas.microsoft.com/office/drawing/2010/main"/>
               </a:ext>
             </a:extLst>
           </a:blip>
@@ -5978,7 +5956,7 @@
         </p:blipFill>
         <p:spPr bwMode="auto">
           <a:xfrm>
-            <a:off x="6635457" y="4175343"/>
+            <a:off x="6799866" y="2193141"/>
             <a:ext cx="1834478" cy="1235859"/>
           </a:xfrm>
           <a:prstGeom prst="rect">
@@ -5998,10 +5976,10 @@
       </p:pic>
       <p:pic>
         <p:nvPicPr>
-          <p:cNvPr id="3" name="Picture 2">
-            <a:extLst>
-              <a:ext uri="{FF2B5EF4-FFF2-40B4-BE49-F238E27FC236}">
-                <a16:creationId xmlns:a16="http://schemas.microsoft.com/office/drawing/2014/main" id="{14B4A702-77E0-1C8E-CF31-4511E3184E62}"/>
+          <p:cNvPr id="40" name="Picture 2">
+            <a:extLst>
+              <a:ext uri="{FF2B5EF4-FFF2-40B4-BE49-F238E27FC236}">
+                <a16:creationId xmlns:a16="http://schemas.microsoft.com/office/drawing/2014/main" id="{F8E798B1-BF6B-57F4-8BC5-FBE909F63238}"/>
               </a:ext>
             </a:extLst>
           </p:cNvPr>
@@ -6011,14 +5989,14 @@
           <p:nvPr/>
         </p:nvPicPr>
         <p:blipFill>
-          <a:blip r:embed="rId16"/>
+          <a:blip r:embed="rId20"/>
           <a:stretch>
             <a:fillRect/>
           </a:stretch>
         </p:blipFill>
         <p:spPr>
           <a:xfrm>
-            <a:off x="1575997" y="5886320"/>
+            <a:off x="56399" y="3900765"/>
             <a:ext cx="2925555" cy="539464"/>
           </a:xfrm>
           <a:prstGeom prst="rect">
@@ -6028,10 +6006,10 @@
       </p:pic>
       <p:pic>
         <p:nvPicPr>
-          <p:cNvPr id="4" name="Picture 3">
-            <a:extLst>
-              <a:ext uri="{FF2B5EF4-FFF2-40B4-BE49-F238E27FC236}">
-                <a16:creationId xmlns:a16="http://schemas.microsoft.com/office/drawing/2014/main" id="{309FDF59-B61F-A9D1-BBAA-D9C947598BFB}"/>
+          <p:cNvPr id="41" name="Picture 3">
+            <a:extLst>
+              <a:ext uri="{FF2B5EF4-FFF2-40B4-BE49-F238E27FC236}">
+                <a16:creationId xmlns:a16="http://schemas.microsoft.com/office/drawing/2014/main" id="{61E7FB33-812F-2DB5-B235-8A52B7C91CB8}"/>
               </a:ext>
             </a:extLst>
           </p:cNvPr>
@@ -6041,14 +6019,20 @@
           <p:nvPr/>
         </p:nvPicPr>
         <p:blipFill>
-          <a:blip r:embed="rId17"/>
+          <a:blip r:embed="rId21" cstate="email">
+            <a:extLst>
+              <a:ext uri="{28A0092B-C50C-407E-A947-70E740481C1C}">
+                <a14:useLocalDpi xmlns:a14="http://schemas.microsoft.com/office/drawing/2010/main"/>
+              </a:ext>
+            </a:extLst>
+          </a:blip>
           <a:stretch>
             <a:fillRect/>
           </a:stretch>
         </p:blipFill>
         <p:spPr>
           <a:xfrm>
-            <a:off x="9250891" y="4559230"/>
+            <a:off x="9324189" y="2539419"/>
             <a:ext cx="2691817" cy="525232"/>
           </a:xfrm>
           <a:prstGeom prst="rect">
@@ -6058,10 +6042,10 @@
       </p:pic>
       <p:pic>
         <p:nvPicPr>
-          <p:cNvPr id="5" name="Picture 4">
-            <a:extLst>
-              <a:ext uri="{FF2B5EF4-FFF2-40B4-BE49-F238E27FC236}">
-                <a16:creationId xmlns:a16="http://schemas.microsoft.com/office/drawing/2014/main" id="{70CF6F61-3EB8-28D1-6735-1F2C95262F78}"/>
+          <p:cNvPr id="42" name="그림 18">
+            <a:extLst>
+              <a:ext uri="{FF2B5EF4-FFF2-40B4-BE49-F238E27FC236}">
+                <a16:creationId xmlns:a16="http://schemas.microsoft.com/office/drawing/2014/main" id="{59FB8D67-6A5E-366D-99AD-05C59ABB0C69}"/>
               </a:ext>
             </a:extLst>
           </p:cNvPr>
@@ -6071,15 +6055,21 @@
           <p:nvPr/>
         </p:nvPicPr>
         <p:blipFill>
-          <a:blip r:embed="rId18"/>
+          <a:blip r:embed="rId22" cstate="email">
+            <a:extLst>
+              <a:ext uri="{28A0092B-C50C-407E-A947-70E740481C1C}">
+                <a14:useLocalDpi xmlns:a14="http://schemas.microsoft.com/office/drawing/2010/main"/>
+              </a:ext>
+            </a:extLst>
+          </a:blip>
           <a:stretch>
             <a:fillRect/>
           </a:stretch>
         </p:blipFill>
         <p:spPr>
           <a:xfrm>
-            <a:off x="867542" y="66006"/>
-            <a:ext cx="1416909" cy="1247092"/>
+            <a:off x="3735800" y="3552211"/>
+            <a:ext cx="1572429" cy="1236571"/>
           </a:xfrm>
           <a:prstGeom prst="rect">
             <a:avLst/>
@@ -6088,40 +6078,10 @@
       </p:pic>
       <p:pic>
         <p:nvPicPr>
-          <p:cNvPr id="6" name="그림 18">
-            <a:extLst>
-              <a:ext uri="{FF2B5EF4-FFF2-40B4-BE49-F238E27FC236}">
-                <a16:creationId xmlns:a16="http://schemas.microsoft.com/office/drawing/2014/main" id="{656B0F6E-D7DE-B2C9-DB9C-9B234DA8FB3E}"/>
-              </a:ext>
-            </a:extLst>
-          </p:cNvPr>
-          <p:cNvPicPr>
-            <a:picLocks noChangeAspect="1"/>
-          </p:cNvPicPr>
-          <p:nvPr/>
-        </p:nvPicPr>
-        <p:blipFill>
-          <a:blip r:embed="rId19"/>
-          <a:stretch>
-            <a:fillRect/>
-          </a:stretch>
-        </p:blipFill>
-        <p:spPr>
-          <a:xfrm>
-            <a:off x="5309785" y="5411202"/>
-            <a:ext cx="1572429" cy="1236571"/>
-          </a:xfrm>
-          <a:prstGeom prst="rect">
-            <a:avLst/>
-          </a:prstGeom>
-        </p:spPr>
-      </p:pic>
-      <p:pic>
-        <p:nvPicPr>
-          <p:cNvPr id="7" name="Picture 8" descr="SKT CI">
-            <a:extLst>
-              <a:ext uri="{FF2B5EF4-FFF2-40B4-BE49-F238E27FC236}">
-                <a16:creationId xmlns:a16="http://schemas.microsoft.com/office/drawing/2014/main" id="{57CA6C32-DDFD-2E99-7DBA-EBA6B0C65050}"/>
+          <p:cNvPr id="43" name="Picture 8" descr="SKT CI">
+            <a:extLst>
+              <a:ext uri="{FF2B5EF4-FFF2-40B4-BE49-F238E27FC236}">
+                <a16:creationId xmlns:a16="http://schemas.microsoft.com/office/drawing/2014/main" id="{584C37AC-09A8-115C-9E93-2F103EDD10CA}"/>
               </a:ext>
             </a:extLst>
           </p:cNvPr>
@@ -6131,10 +6091,10 @@
           <p:nvPr/>
         </p:nvPicPr>
         <p:blipFill>
-          <a:blip r:embed="rId20">
+          <a:blip r:embed="rId23" cstate="email">
             <a:extLst>
               <a:ext uri="{28A0092B-C50C-407E-A947-70E740481C1C}">
-                <a14:useLocalDpi xmlns:a14="http://schemas.microsoft.com/office/drawing/2010/main" val="0"/>
+                <a14:useLocalDpi xmlns:a14="http://schemas.microsoft.com/office/drawing/2010/main"/>
               </a:ext>
             </a:extLst>
           </a:blip>
@@ -6145,7 +6105,7 @@
         </p:blipFill>
         <p:spPr bwMode="auto">
           <a:xfrm>
-            <a:off x="8073957" y="5558391"/>
+            <a:off x="6441109" y="3683240"/>
             <a:ext cx="2535251" cy="974511"/>
           </a:xfrm>
           <a:prstGeom prst="rect">
@@ -6163,42 +6123,12 @@
           </a:extLst>
         </p:spPr>
       </p:pic>
-    </p:spTree>
-    <p:extLst>
-      <p:ext uri="{BB962C8B-B14F-4D97-AF65-F5344CB8AC3E}">
-        <p14:creationId xmlns:p14="http://schemas.microsoft.com/office/powerpoint/2010/main" val="1878316114"/>
-      </p:ext>
-    </p:extLst>
-  </p:cSld>
-  <p:clrMapOvr>
-    <a:masterClrMapping/>
-  </p:clrMapOvr>
-</p:sld>
-</file>
-
-<file path=ppt/slides/slide4.xml><?xml version="1.0" encoding="utf-8"?>
-<p:sld xmlns:a="http://schemas.openxmlformats.org/drawingml/2006/main" xmlns:r="http://schemas.openxmlformats.org/officeDocument/2006/relationships" xmlns:p="http://schemas.openxmlformats.org/presentationml/2006/main">
-  <p:cSld>
-    <p:spTree>
-      <p:nvGrpSpPr>
-        <p:cNvPr id="1" name=""/>
-        <p:cNvGrpSpPr/>
-        <p:nvPr/>
-      </p:nvGrpSpPr>
-      <p:grpSpPr>
-        <a:xfrm>
-          <a:off x="0" y="0"/>
-          <a:ext cx="0" cy="0"/>
-          <a:chOff x="0" y="0"/>
-          <a:chExt cx="0" cy="0"/>
-        </a:xfrm>
-      </p:grpSpPr>
       <p:pic>
         <p:nvPicPr>
-          <p:cNvPr id="20" name="Picture 19">
-            <a:extLst>
-              <a:ext uri="{FF2B5EF4-FFF2-40B4-BE49-F238E27FC236}">
-                <a16:creationId xmlns:a16="http://schemas.microsoft.com/office/drawing/2014/main" id="{C8D8A3BB-A315-4843-9192-8B7C90007206}"/>
+          <p:cNvPr id="44" name="그림 43">
+            <a:extLst>
+              <a:ext uri="{FF2B5EF4-FFF2-40B4-BE49-F238E27FC236}">
+                <a16:creationId xmlns:a16="http://schemas.microsoft.com/office/drawing/2014/main" id="{661BDE38-DE21-A987-F68F-67F1D5C7F44A}"/>
               </a:ext>
             </a:extLst>
           </p:cNvPr>
@@ -6208,15 +6138,21 @@
           <p:nvPr/>
         </p:nvPicPr>
         <p:blipFill>
-          <a:blip r:embed="rId2"/>
+          <a:blip r:embed="rId24" cstate="email">
+            <a:extLst>
+              <a:ext uri="{28A0092B-C50C-407E-A947-70E740481C1C}">
+                <a14:useLocalDpi xmlns:a14="http://schemas.microsoft.com/office/drawing/2010/main"/>
+              </a:ext>
+            </a:extLst>
+          </a:blip>
           <a:stretch>
             <a:fillRect/>
           </a:stretch>
         </p:blipFill>
         <p:spPr>
           <a:xfrm>
-            <a:off x="3409619" y="211577"/>
-            <a:ext cx="2438400" cy="914400"/>
+            <a:off x="3161059" y="2545525"/>
+            <a:ext cx="2887800" cy="531090"/>
           </a:xfrm>
           <a:prstGeom prst="rect">
             <a:avLst/>
@@ -6225,10 +6161,10 @@
       </p:pic>
       <p:pic>
         <p:nvPicPr>
-          <p:cNvPr id="21" name="그림 16">
-            <a:extLst>
-              <a:ext uri="{FF2B5EF4-FFF2-40B4-BE49-F238E27FC236}">
-                <a16:creationId xmlns:a16="http://schemas.microsoft.com/office/drawing/2014/main" id="{0C70F9D8-AECB-B643-AC53-6BDEFD9660D9}"/>
+          <p:cNvPr id="45" name="그림 44">
+            <a:extLst>
+              <a:ext uri="{FF2B5EF4-FFF2-40B4-BE49-F238E27FC236}">
+                <a16:creationId xmlns:a16="http://schemas.microsoft.com/office/drawing/2014/main" id="{F54AEF18-52C0-611D-88AB-0FAA795735D5}"/>
               </a:ext>
             </a:extLst>
           </p:cNvPr>
@@ -6238,234 +6174,7 @@
           <p:nvPr/>
         </p:nvPicPr>
         <p:blipFill>
-          <a:blip r:embed="rId3"/>
-          <a:stretch>
-            <a:fillRect/>
-          </a:stretch>
-        </p:blipFill>
-        <p:spPr>
-          <a:xfrm>
-            <a:off x="6152819" y="429781"/>
-            <a:ext cx="2880360" cy="477991"/>
-          </a:xfrm>
-          <a:prstGeom prst="rect">
-            <a:avLst/>
-          </a:prstGeom>
-        </p:spPr>
-      </p:pic>
-      <p:pic>
-        <p:nvPicPr>
-          <p:cNvPr id="22" name="Picture 21">
-            <a:extLst>
-              <a:ext uri="{FF2B5EF4-FFF2-40B4-BE49-F238E27FC236}">
-                <a16:creationId xmlns:a16="http://schemas.microsoft.com/office/drawing/2014/main" id="{D8B7F372-9939-1C44-BDB1-E2B0E94BAA1D}"/>
-              </a:ext>
-            </a:extLst>
-          </p:cNvPr>
-          <p:cNvPicPr>
-            <a:picLocks noChangeAspect="1"/>
-          </p:cNvPicPr>
-          <p:nvPr/>
-        </p:nvPicPr>
-        <p:blipFill>
-          <a:blip r:embed="rId4"/>
-          <a:stretch>
-            <a:fillRect/>
-          </a:stretch>
-        </p:blipFill>
-        <p:spPr>
-          <a:xfrm>
-            <a:off x="9289719" y="264916"/>
-            <a:ext cx="2692400" cy="807720"/>
-          </a:xfrm>
-          <a:prstGeom prst="rect">
-            <a:avLst/>
-          </a:prstGeom>
-        </p:spPr>
-      </p:pic>
-      <p:pic>
-        <p:nvPicPr>
-          <p:cNvPr id="23" name="Picture 22">
-            <a:extLst>
-              <a:ext uri="{FF2B5EF4-FFF2-40B4-BE49-F238E27FC236}">
-                <a16:creationId xmlns:a16="http://schemas.microsoft.com/office/drawing/2014/main" id="{B2A7E2CC-965A-4C48-AE11-696AD5BE9557}"/>
-              </a:ext>
-            </a:extLst>
-          </p:cNvPr>
-          <p:cNvPicPr>
-            <a:picLocks noChangeAspect="1"/>
-          </p:cNvPicPr>
-          <p:nvPr/>
-        </p:nvPicPr>
-        <p:blipFill>
-          <a:blip r:embed="rId5"/>
-          <a:stretch>
-            <a:fillRect/>
-          </a:stretch>
-        </p:blipFill>
-        <p:spPr>
-          <a:xfrm>
-            <a:off x="242497" y="1599132"/>
-            <a:ext cx="2667000" cy="941647"/>
-          </a:xfrm>
-          <a:prstGeom prst="rect">
-            <a:avLst/>
-          </a:prstGeom>
-        </p:spPr>
-      </p:pic>
-      <p:pic>
-        <p:nvPicPr>
-          <p:cNvPr id="24" name="그림 5">
-            <a:extLst>
-              <a:ext uri="{FF2B5EF4-FFF2-40B4-BE49-F238E27FC236}">
-                <a16:creationId xmlns:a16="http://schemas.microsoft.com/office/drawing/2014/main" id="{99A22A7B-2B39-F444-87CF-D942FA5EFAAA}"/>
-              </a:ext>
-            </a:extLst>
-          </p:cNvPr>
-          <p:cNvPicPr>
-            <a:picLocks noChangeAspect="1"/>
-          </p:cNvPicPr>
-          <p:nvPr/>
-        </p:nvPicPr>
-        <p:blipFill>
-          <a:blip r:embed="rId6"/>
-          <a:stretch>
-            <a:fillRect/>
-          </a:stretch>
-        </p:blipFill>
-        <p:spPr>
-          <a:xfrm>
-            <a:off x="3409619" y="1578551"/>
-            <a:ext cx="2387373" cy="1016844"/>
-          </a:xfrm>
-          <a:prstGeom prst="rect">
-            <a:avLst/>
-          </a:prstGeom>
-        </p:spPr>
-      </p:pic>
-      <p:pic>
-        <p:nvPicPr>
-          <p:cNvPr id="26" name="Picture 25">
-            <a:extLst>
-              <a:ext uri="{FF2B5EF4-FFF2-40B4-BE49-F238E27FC236}">
-                <a16:creationId xmlns:a16="http://schemas.microsoft.com/office/drawing/2014/main" id="{2CE40AB1-6456-204B-8528-90EF22A94915}"/>
-              </a:ext>
-            </a:extLst>
-          </p:cNvPr>
-          <p:cNvPicPr>
-            <a:picLocks noChangeAspect="1"/>
-          </p:cNvPicPr>
-          <p:nvPr/>
-        </p:nvPicPr>
-        <p:blipFill>
-          <a:blip r:embed="rId7"/>
-          <a:stretch>
-            <a:fillRect/>
-          </a:stretch>
-        </p:blipFill>
-        <p:spPr>
-          <a:xfrm>
-            <a:off x="6223271" y="1736740"/>
-            <a:ext cx="2880360" cy="700465"/>
-          </a:xfrm>
-          <a:prstGeom prst="rect">
-            <a:avLst/>
-          </a:prstGeom>
-        </p:spPr>
-      </p:pic>
-      <p:pic>
-        <p:nvPicPr>
-          <p:cNvPr id="27" name="Picture 10" descr="Koh Young Technology - 2020년 전문연구요원 모집">
-            <a:extLst>
-              <a:ext uri="{FF2B5EF4-FFF2-40B4-BE49-F238E27FC236}">
-                <a16:creationId xmlns:a16="http://schemas.microsoft.com/office/drawing/2014/main" id="{1D36A79E-B117-4D43-95C5-22B27EE8E89C}"/>
-              </a:ext>
-            </a:extLst>
-          </p:cNvPr>
-          <p:cNvPicPr>
-            <a:picLocks noChangeAspect="1" noChangeArrowheads="1"/>
-          </p:cNvPicPr>
-          <p:nvPr/>
-        </p:nvPicPr>
-        <p:blipFill>
-          <a:blip r:embed="rId8">
-            <a:extLst>
-              <a:ext uri="{28A0092B-C50C-407E-A947-70E740481C1C}">
-                <a14:useLocalDpi xmlns:a14="http://schemas.microsoft.com/office/drawing/2010/main" val="0"/>
-              </a:ext>
-            </a:extLst>
-          </a:blip>
-          <a:srcRect/>
-          <a:stretch>
-            <a:fillRect/>
-          </a:stretch>
-        </p:blipFill>
-        <p:spPr bwMode="auto">
-          <a:xfrm>
-            <a:off x="521147" y="2772325"/>
-            <a:ext cx="2118811" cy="1260967"/>
-          </a:xfrm>
-          <a:prstGeom prst="rect">
-            <a:avLst/>
-          </a:prstGeom>
-          <a:noFill/>
-          <a:extLst>
-            <a:ext uri="{909E8E84-426E-40DD-AFC4-6F175D3DCCD1}">
-              <a14:hiddenFill xmlns:a14="http://schemas.microsoft.com/office/drawing/2010/main">
-                <a:solidFill>
-                  <a:srgbClr val="FFFFFF"/>
-                </a:solidFill>
-              </a14:hiddenFill>
-            </a:ext>
-          </a:extLst>
-        </p:spPr>
-      </p:pic>
-      <p:pic>
-        <p:nvPicPr>
-          <p:cNvPr id="28" name="그림 7">
-            <a:extLst>
-              <a:ext uri="{FF2B5EF4-FFF2-40B4-BE49-F238E27FC236}">
-                <a16:creationId xmlns:a16="http://schemas.microsoft.com/office/drawing/2014/main" id="{3606F132-6404-0C4D-997C-E843E8DDE0C8}"/>
-              </a:ext>
-            </a:extLst>
-          </p:cNvPr>
-          <p:cNvPicPr>
-            <a:picLocks noChangeAspect="1"/>
-          </p:cNvPicPr>
-          <p:nvPr/>
-        </p:nvPicPr>
-        <p:blipFill>
-          <a:blip r:embed="rId9"/>
-          <a:stretch>
-            <a:fillRect/>
-          </a:stretch>
-        </p:blipFill>
-        <p:spPr>
-          <a:xfrm>
-            <a:off x="3882256" y="2940597"/>
-            <a:ext cx="1154717" cy="970631"/>
-          </a:xfrm>
-          <a:prstGeom prst="rect">
-            <a:avLst/>
-          </a:prstGeom>
-        </p:spPr>
-      </p:pic>
-      <p:pic>
-        <p:nvPicPr>
-          <p:cNvPr id="29" name="Picture 28">
-            <a:extLst>
-              <a:ext uri="{FF2B5EF4-FFF2-40B4-BE49-F238E27FC236}">
-                <a16:creationId xmlns:a16="http://schemas.microsoft.com/office/drawing/2014/main" id="{613EED19-8BFE-7F41-AA99-DEDEC5D69CC2}"/>
-              </a:ext>
-            </a:extLst>
-          </p:cNvPr>
-          <p:cNvPicPr>
-            <a:picLocks noChangeAspect="1"/>
-          </p:cNvPicPr>
-          <p:nvPr/>
-        </p:nvPicPr>
-        <p:blipFill>
-          <a:blip r:embed="rId10" cstate="email">
+          <a:blip r:embed="rId25" cstate="email">
             <a:extLst>
               <a:ext uri="{28A0092B-C50C-407E-A947-70E740481C1C}">
                 <a14:useLocalDpi xmlns:a14="http://schemas.microsoft.com/office/drawing/2010/main"/>
@@ -6478,399 +6187,8 @@
         </p:blipFill>
         <p:spPr>
           <a:xfrm>
-            <a:off x="9854119" y="1366611"/>
-            <a:ext cx="1710337" cy="1406691"/>
-          </a:xfrm>
-          <a:prstGeom prst="rect">
-            <a:avLst/>
-          </a:prstGeom>
-        </p:spPr>
-      </p:pic>
-      <p:pic>
-        <p:nvPicPr>
-          <p:cNvPr id="30" name="그림 11">
-            <a:extLst>
-              <a:ext uri="{FF2B5EF4-FFF2-40B4-BE49-F238E27FC236}">
-                <a16:creationId xmlns:a16="http://schemas.microsoft.com/office/drawing/2014/main" id="{6345D305-77DB-044B-8C53-8EE3A0C2A555}"/>
-              </a:ext>
-            </a:extLst>
-          </p:cNvPr>
-          <p:cNvPicPr>
-            <a:picLocks noChangeAspect="1"/>
-          </p:cNvPicPr>
-          <p:nvPr/>
-        </p:nvPicPr>
-        <p:blipFill>
-          <a:blip r:embed="rId11">
-            <a:extLst>
-              <a:ext uri="{28A0092B-C50C-407E-A947-70E740481C1C}">
-                <a14:useLocalDpi xmlns:a14="http://schemas.microsoft.com/office/drawing/2010/main" val="0"/>
-              </a:ext>
-            </a:extLst>
-          </a:blip>
-          <a:stretch>
-            <a:fillRect/>
-          </a:stretch>
-        </p:blipFill>
-        <p:spPr>
-          <a:xfrm>
-            <a:off x="6288195" y="2936970"/>
-            <a:ext cx="2421785" cy="915174"/>
-          </a:xfrm>
-          <a:prstGeom prst="rect">
-            <a:avLst/>
-          </a:prstGeom>
-        </p:spPr>
-      </p:pic>
-      <p:pic>
-        <p:nvPicPr>
-          <p:cNvPr id="31" name="Picture 26" descr="라인플러스 기업정보 보기">
-            <a:extLst>
-              <a:ext uri="{FF2B5EF4-FFF2-40B4-BE49-F238E27FC236}">
-                <a16:creationId xmlns:a16="http://schemas.microsoft.com/office/drawing/2014/main" id="{18C65C2F-682C-974F-BD11-57A3CD7CEC2A}"/>
-              </a:ext>
-            </a:extLst>
-          </p:cNvPr>
-          <p:cNvPicPr>
-            <a:picLocks noChangeAspect="1" noChangeArrowheads="1"/>
-          </p:cNvPicPr>
-          <p:nvPr/>
-        </p:nvPicPr>
-        <p:blipFill>
-          <a:blip r:embed="rId12">
-            <a:extLst>
-              <a:ext uri="{28A0092B-C50C-407E-A947-70E740481C1C}">
-                <a14:useLocalDpi xmlns:a14="http://schemas.microsoft.com/office/drawing/2010/main" val="0"/>
-              </a:ext>
-            </a:extLst>
-          </a:blip>
-          <a:srcRect/>
-          <a:stretch>
-            <a:fillRect/>
-          </a:stretch>
-        </p:blipFill>
-        <p:spPr bwMode="auto">
-          <a:xfrm>
-            <a:off x="444848" y="4438125"/>
-            <a:ext cx="2195110" cy="767441"/>
-          </a:xfrm>
-          <a:prstGeom prst="rect">
-            <a:avLst/>
-          </a:prstGeom>
-          <a:noFill/>
-          <a:extLst>
-            <a:ext uri="{909E8E84-426E-40DD-AFC4-6F175D3DCCD1}">
-              <a14:hiddenFill xmlns:a14="http://schemas.microsoft.com/office/drawing/2010/main">
-                <a:solidFill>
-                  <a:srgbClr val="FFFFFF"/>
-                </a:solidFill>
-              </a14:hiddenFill>
-            </a:ext>
-          </a:extLst>
-        </p:spPr>
-      </p:pic>
-      <p:pic>
-        <p:nvPicPr>
-          <p:cNvPr id="32" name="Picture 30" descr="LG전자 (엘지) 로고">
-            <a:extLst>
-              <a:ext uri="{FF2B5EF4-FFF2-40B4-BE49-F238E27FC236}">
-                <a16:creationId xmlns:a16="http://schemas.microsoft.com/office/drawing/2014/main" id="{9ECF1BB6-CF62-E045-8E30-20880B8BFA23}"/>
-              </a:ext>
-            </a:extLst>
-          </p:cNvPr>
-          <p:cNvPicPr>
-            <a:picLocks noChangeAspect="1" noChangeArrowheads="1"/>
-          </p:cNvPicPr>
-          <p:nvPr/>
-        </p:nvPicPr>
-        <p:blipFill>
-          <a:blip r:embed="rId13">
-            <a:extLst>
-              <a:ext uri="{28A0092B-C50C-407E-A947-70E740481C1C}">
-                <a14:useLocalDpi xmlns:a14="http://schemas.microsoft.com/office/drawing/2010/main" val="0"/>
-              </a:ext>
-            </a:extLst>
-          </a:blip>
-          <a:srcRect/>
-          <a:stretch>
-            <a:fillRect/>
-          </a:stretch>
-        </p:blipFill>
-        <p:spPr bwMode="auto">
-          <a:xfrm>
-            <a:off x="9013211" y="3075679"/>
-            <a:ext cx="3191993" cy="700465"/>
-          </a:xfrm>
-          <a:prstGeom prst="rect">
-            <a:avLst/>
-          </a:prstGeom>
-          <a:noFill/>
-          <a:extLst>
-            <a:ext uri="{909E8E84-426E-40DD-AFC4-6F175D3DCCD1}">
-              <a14:hiddenFill xmlns:a14="http://schemas.microsoft.com/office/drawing/2010/main">
-                <a:solidFill>
-                  <a:srgbClr val="FFFFFF"/>
-                </a:solidFill>
-              </a14:hiddenFill>
-            </a:ext>
-          </a:extLst>
-        </p:spPr>
-      </p:pic>
-      <p:pic>
-        <p:nvPicPr>
-          <p:cNvPr id="33" name="Picture 4">
-            <a:extLst>
-              <a:ext uri="{FF2B5EF4-FFF2-40B4-BE49-F238E27FC236}">
-                <a16:creationId xmlns:a16="http://schemas.microsoft.com/office/drawing/2014/main" id="{FD52486A-2809-7943-B331-D672480B10E9}"/>
-              </a:ext>
-            </a:extLst>
-          </p:cNvPr>
-          <p:cNvPicPr>
-            <a:picLocks noChangeAspect="1" noChangeArrowheads="1"/>
-          </p:cNvPicPr>
-          <p:nvPr/>
-        </p:nvPicPr>
-        <p:blipFill>
-          <a:blip r:embed="rId14" cstate="email">
-            <a:extLst>
-              <a:ext uri="{28A0092B-C50C-407E-A947-70E740481C1C}">
-                <a14:useLocalDpi xmlns:a14="http://schemas.microsoft.com/office/drawing/2010/main"/>
-              </a:ext>
-            </a:extLst>
-          </a:blip>
-          <a:srcRect/>
-          <a:stretch>
-            <a:fillRect/>
-          </a:stretch>
-        </p:blipFill>
-        <p:spPr bwMode="auto">
-          <a:xfrm>
-            <a:off x="3637371" y="4343621"/>
-            <a:ext cx="1904074" cy="970631"/>
-          </a:xfrm>
-          <a:prstGeom prst="rect">
-            <a:avLst/>
-          </a:prstGeom>
-          <a:noFill/>
-          <a:extLst>
-            <a:ext uri="{909E8E84-426E-40DD-AFC4-6F175D3DCCD1}">
-              <a14:hiddenFill xmlns:a14="http://schemas.microsoft.com/office/drawing/2010/main">
-                <a:solidFill>
-                  <a:srgbClr val="FFFFFF"/>
-                </a:solidFill>
-              </a14:hiddenFill>
-            </a:ext>
-          </a:extLst>
-        </p:spPr>
-      </p:pic>
-      <p:pic>
-        <p:nvPicPr>
-          <p:cNvPr id="35" name="Picture 28" descr="image.fnnews.com/resource/media/image/2020/01/0...">
-            <a:extLst>
-              <a:ext uri="{FF2B5EF4-FFF2-40B4-BE49-F238E27FC236}">
-                <a16:creationId xmlns:a16="http://schemas.microsoft.com/office/drawing/2014/main" id="{C1F7B736-09FE-3144-A90D-1D9F7E8AA714}"/>
-              </a:ext>
-            </a:extLst>
-          </p:cNvPr>
-          <p:cNvPicPr>
-            <a:picLocks noChangeAspect="1" noChangeArrowheads="1"/>
-          </p:cNvPicPr>
-          <p:nvPr/>
-        </p:nvPicPr>
-        <p:blipFill>
-          <a:blip r:embed="rId15">
-            <a:extLst>
-              <a:ext uri="{28A0092B-C50C-407E-A947-70E740481C1C}">
-                <a14:useLocalDpi xmlns:a14="http://schemas.microsoft.com/office/drawing/2010/main" val="0"/>
-              </a:ext>
-            </a:extLst>
-          </a:blip>
-          <a:srcRect/>
-          <a:stretch>
-            <a:fillRect/>
-          </a:stretch>
-        </p:blipFill>
-        <p:spPr bwMode="auto">
-          <a:xfrm>
-            <a:off x="6635457" y="4175343"/>
-            <a:ext cx="1834478" cy="1235859"/>
-          </a:xfrm>
-          <a:prstGeom prst="rect">
-            <a:avLst/>
-          </a:prstGeom>
-          <a:noFill/>
-          <a:extLst>
-            <a:ext uri="{909E8E84-426E-40DD-AFC4-6F175D3DCCD1}">
-              <a14:hiddenFill xmlns:a14="http://schemas.microsoft.com/office/drawing/2010/main">
-                <a:solidFill>
-                  <a:srgbClr val="FFFFFF"/>
-                </a:solidFill>
-              </a14:hiddenFill>
-            </a:ext>
-          </a:extLst>
-        </p:spPr>
-      </p:pic>
-      <p:pic>
-        <p:nvPicPr>
-          <p:cNvPr id="36" name="그림 18">
-            <a:extLst>
-              <a:ext uri="{FF2B5EF4-FFF2-40B4-BE49-F238E27FC236}">
-                <a16:creationId xmlns:a16="http://schemas.microsoft.com/office/drawing/2014/main" id="{ADEF09C9-CE62-2A48-829C-8FA613F9EC60}"/>
-              </a:ext>
-            </a:extLst>
-          </p:cNvPr>
-          <p:cNvPicPr>
-            <a:picLocks noChangeAspect="1"/>
-          </p:cNvPicPr>
-          <p:nvPr/>
-        </p:nvPicPr>
-        <p:blipFill>
-          <a:blip r:embed="rId16"/>
-          <a:stretch>
-            <a:fillRect/>
-          </a:stretch>
-        </p:blipFill>
-        <p:spPr>
-          <a:xfrm>
-            <a:off x="5309785" y="5411202"/>
-            <a:ext cx="1572429" cy="1236571"/>
-          </a:xfrm>
-          <a:prstGeom prst="rect">
-            <a:avLst/>
-          </a:prstGeom>
-        </p:spPr>
-      </p:pic>
-      <p:pic>
-        <p:nvPicPr>
-          <p:cNvPr id="37" name="Picture 8" descr="SKT CI">
-            <a:extLst>
-              <a:ext uri="{FF2B5EF4-FFF2-40B4-BE49-F238E27FC236}">
-                <a16:creationId xmlns:a16="http://schemas.microsoft.com/office/drawing/2014/main" id="{A6C70536-FAD6-E847-98E1-FAD0497B0ED7}"/>
-              </a:ext>
-            </a:extLst>
-          </p:cNvPr>
-          <p:cNvPicPr>
-            <a:picLocks noChangeAspect="1" noChangeArrowheads="1"/>
-          </p:cNvPicPr>
-          <p:nvPr/>
-        </p:nvPicPr>
-        <p:blipFill>
-          <a:blip r:embed="rId17">
-            <a:extLst>
-              <a:ext uri="{28A0092B-C50C-407E-A947-70E740481C1C}">
-                <a14:useLocalDpi xmlns:a14="http://schemas.microsoft.com/office/drawing/2010/main" val="0"/>
-              </a:ext>
-            </a:extLst>
-          </a:blip>
-          <a:srcRect/>
-          <a:stretch>
-            <a:fillRect/>
-          </a:stretch>
-        </p:blipFill>
-        <p:spPr bwMode="auto">
-          <a:xfrm>
-            <a:off x="8073957" y="5558391"/>
-            <a:ext cx="2535251" cy="974511"/>
-          </a:xfrm>
-          <a:prstGeom prst="rect">
-            <a:avLst/>
-          </a:prstGeom>
-          <a:noFill/>
-          <a:extLst>
-            <a:ext uri="{909E8E84-426E-40DD-AFC4-6F175D3DCCD1}">
-              <a14:hiddenFill xmlns:a14="http://schemas.microsoft.com/office/drawing/2010/main">
-                <a:solidFill>
-                  <a:srgbClr val="FFFFFF"/>
-                </a:solidFill>
-              </a14:hiddenFill>
-            </a:ext>
-          </a:extLst>
-        </p:spPr>
-      </p:pic>
-      <p:pic>
-        <p:nvPicPr>
-          <p:cNvPr id="3" name="Picture 2">
-            <a:extLst>
-              <a:ext uri="{FF2B5EF4-FFF2-40B4-BE49-F238E27FC236}">
-                <a16:creationId xmlns:a16="http://schemas.microsoft.com/office/drawing/2014/main" id="{14B4A702-77E0-1C8E-CF31-4511E3184E62}"/>
-              </a:ext>
-            </a:extLst>
-          </p:cNvPr>
-          <p:cNvPicPr>
-            <a:picLocks noChangeAspect="1"/>
-          </p:cNvPicPr>
-          <p:nvPr/>
-        </p:nvPicPr>
-        <p:blipFill>
-          <a:blip r:embed="rId18"/>
-          <a:stretch>
-            <a:fillRect/>
-          </a:stretch>
-        </p:blipFill>
-        <p:spPr>
-          <a:xfrm>
-            <a:off x="1575997" y="5886320"/>
-            <a:ext cx="2925555" cy="539464"/>
-          </a:xfrm>
-          <a:prstGeom prst="rect">
-            <a:avLst/>
-          </a:prstGeom>
-        </p:spPr>
-      </p:pic>
-      <p:pic>
-        <p:nvPicPr>
-          <p:cNvPr id="4" name="Picture 3">
-            <a:extLst>
-              <a:ext uri="{FF2B5EF4-FFF2-40B4-BE49-F238E27FC236}">
-                <a16:creationId xmlns:a16="http://schemas.microsoft.com/office/drawing/2014/main" id="{309FDF59-B61F-A9D1-BBAA-D9C947598BFB}"/>
-              </a:ext>
-            </a:extLst>
-          </p:cNvPr>
-          <p:cNvPicPr>
-            <a:picLocks noChangeAspect="1"/>
-          </p:cNvPicPr>
-          <p:nvPr/>
-        </p:nvPicPr>
-        <p:blipFill>
-          <a:blip r:embed="rId19"/>
-          <a:stretch>
-            <a:fillRect/>
-          </a:stretch>
-        </p:blipFill>
-        <p:spPr>
-          <a:xfrm>
-            <a:off x="9250891" y="4559230"/>
-            <a:ext cx="2691817" cy="525232"/>
-          </a:xfrm>
-          <a:prstGeom prst="rect">
-            <a:avLst/>
-          </a:prstGeom>
-        </p:spPr>
-      </p:pic>
-      <p:pic>
-        <p:nvPicPr>
-          <p:cNvPr id="5" name="Picture 4">
-            <a:extLst>
-              <a:ext uri="{FF2B5EF4-FFF2-40B4-BE49-F238E27FC236}">
-                <a16:creationId xmlns:a16="http://schemas.microsoft.com/office/drawing/2014/main" id="{70CF6F61-3EB8-28D1-6735-1F2C95262F78}"/>
-              </a:ext>
-            </a:extLst>
-          </p:cNvPr>
-          <p:cNvPicPr>
-            <a:picLocks noChangeAspect="1"/>
-          </p:cNvPicPr>
-          <p:nvPr/>
-        </p:nvPicPr>
-        <p:blipFill>
-          <a:blip r:embed="rId20"/>
-          <a:stretch>
-            <a:fillRect/>
-          </a:stretch>
-        </p:blipFill>
-        <p:spPr>
-          <a:xfrm>
-            <a:off x="867542" y="66006"/>
-            <a:ext cx="1416909" cy="1247092"/>
+            <a:off x="9070338" y="3728751"/>
+            <a:ext cx="3098429" cy="883487"/>
           </a:xfrm>
           <a:prstGeom prst="rect">
             <a:avLst/>
@@ -6880,7 +6198,7 @@
     </p:spTree>
     <p:extLst>
       <p:ext uri="{BB962C8B-B14F-4D97-AF65-F5344CB8AC3E}">
-        <p14:creationId xmlns:p14="http://schemas.microsoft.com/office/powerpoint/2010/main" val="1647428447"/>
+        <p14:creationId xmlns:p14="http://schemas.microsoft.com/office/powerpoint/2010/main" val="1885938341"/>
       </p:ext>
     </p:extLst>
   </p:cSld>

</xml_diff>